<commit_message>
Update the System Workflow and Manual Mode Control section of the UPC-UA doc.
</commit_message>
<xml_diff>
--- a/OPCUA_PLC_Simulator/doc/desigDoc.pptx
+++ b/OPCUA_PLC_Simulator/doc/desigDoc.pptx
@@ -7,6 +7,7 @@
   <p:sldIdLst>
     <p:sldId id="256" r:id="rId2"/>
     <p:sldId id="268" r:id="rId3"/>
+    <p:sldId id="270" r:id="rId4"/>
   </p:sldIdLst>
   <p:sldSz cx="12192000" cy="6858000"/>
   <p:notesSz cx="6858000" cy="9144000"/>
@@ -262,7 +263,7 @@
           <a:p>
             <a:fld id="{5D72A3BA-B397-446C-B373-EC30C6B5623D}" type="datetimeFigureOut">
               <a:rPr lang="en-SG" smtClean="0"/>
-              <a:t>7/12/2025</a:t>
+              <a:t>10/12/2025</a:t>
             </a:fld>
             <a:endParaRPr lang="en-SG"/>
           </a:p>
@@ -462,7 +463,7 @@
           <a:p>
             <a:fld id="{5D72A3BA-B397-446C-B373-EC30C6B5623D}" type="datetimeFigureOut">
               <a:rPr lang="en-SG" smtClean="0"/>
-              <a:t>7/12/2025</a:t>
+              <a:t>10/12/2025</a:t>
             </a:fld>
             <a:endParaRPr lang="en-SG"/>
           </a:p>
@@ -672,7 +673,7 @@
           <a:p>
             <a:fld id="{5D72A3BA-B397-446C-B373-EC30C6B5623D}" type="datetimeFigureOut">
               <a:rPr lang="en-SG" smtClean="0"/>
-              <a:t>7/12/2025</a:t>
+              <a:t>10/12/2025</a:t>
             </a:fld>
             <a:endParaRPr lang="en-SG"/>
           </a:p>
@@ -872,7 +873,7 @@
           <a:p>
             <a:fld id="{5D72A3BA-B397-446C-B373-EC30C6B5623D}" type="datetimeFigureOut">
               <a:rPr lang="en-SG" smtClean="0"/>
-              <a:t>7/12/2025</a:t>
+              <a:t>10/12/2025</a:t>
             </a:fld>
             <a:endParaRPr lang="en-SG"/>
           </a:p>
@@ -1148,7 +1149,7 @@
           <a:p>
             <a:fld id="{5D72A3BA-B397-446C-B373-EC30C6B5623D}" type="datetimeFigureOut">
               <a:rPr lang="en-SG" smtClean="0"/>
-              <a:t>7/12/2025</a:t>
+              <a:t>10/12/2025</a:t>
             </a:fld>
             <a:endParaRPr lang="en-SG"/>
           </a:p>
@@ -1416,7 +1417,7 @@
           <a:p>
             <a:fld id="{5D72A3BA-B397-446C-B373-EC30C6B5623D}" type="datetimeFigureOut">
               <a:rPr lang="en-SG" smtClean="0"/>
-              <a:t>7/12/2025</a:t>
+              <a:t>10/12/2025</a:t>
             </a:fld>
             <a:endParaRPr lang="en-SG"/>
           </a:p>
@@ -1831,7 +1832,7 @@
           <a:p>
             <a:fld id="{5D72A3BA-B397-446C-B373-EC30C6B5623D}" type="datetimeFigureOut">
               <a:rPr lang="en-SG" smtClean="0"/>
-              <a:t>7/12/2025</a:t>
+              <a:t>10/12/2025</a:t>
             </a:fld>
             <a:endParaRPr lang="en-SG"/>
           </a:p>
@@ -1973,7 +1974,7 @@
           <a:p>
             <a:fld id="{5D72A3BA-B397-446C-B373-EC30C6B5623D}" type="datetimeFigureOut">
               <a:rPr lang="en-SG" smtClean="0"/>
-              <a:t>7/12/2025</a:t>
+              <a:t>10/12/2025</a:t>
             </a:fld>
             <a:endParaRPr lang="en-SG"/>
           </a:p>
@@ -2086,7 +2087,7 @@
           <a:p>
             <a:fld id="{5D72A3BA-B397-446C-B373-EC30C6B5623D}" type="datetimeFigureOut">
               <a:rPr lang="en-SG" smtClean="0"/>
-              <a:t>7/12/2025</a:t>
+              <a:t>10/12/2025</a:t>
             </a:fld>
             <a:endParaRPr lang="en-SG"/>
           </a:p>
@@ -2399,7 +2400,7 @@
           <a:p>
             <a:fld id="{5D72A3BA-B397-446C-B373-EC30C6B5623D}" type="datetimeFigureOut">
               <a:rPr lang="en-SG" smtClean="0"/>
-              <a:t>7/12/2025</a:t>
+              <a:t>10/12/2025</a:t>
             </a:fld>
             <a:endParaRPr lang="en-SG"/>
           </a:p>
@@ -2688,7 +2689,7 @@
           <a:p>
             <a:fld id="{5D72A3BA-B397-446C-B373-EC30C6B5623D}" type="datetimeFigureOut">
               <a:rPr lang="en-SG" smtClean="0"/>
-              <a:t>7/12/2025</a:t>
+              <a:t>10/12/2025</a:t>
             </a:fld>
             <a:endParaRPr lang="en-SG"/>
           </a:p>
@@ -2931,7 +2932,7 @@
           <a:p>
             <a:fld id="{5D72A3BA-B397-446C-B373-EC30C6B5623D}" type="datetimeFigureOut">
               <a:rPr lang="en-SG" smtClean="0"/>
-              <a:t>7/12/2025</a:t>
+              <a:t>10/12/2025</a:t>
             </a:fld>
             <a:endParaRPr lang="en-SG"/>
           </a:p>
@@ -9684,6 +9685,1723 @@
 </p:sld>
 </file>
 
+<file path=ppt/slides/slide3.xml><?xml version="1.0" encoding="utf-8"?>
+<p:sld xmlns:a="http://schemas.openxmlformats.org/drawingml/2006/main" xmlns:r="http://schemas.openxmlformats.org/officeDocument/2006/relationships" xmlns:p="http://schemas.openxmlformats.org/presentationml/2006/main">
+  <p:cSld>
+    <p:spTree>
+      <p:nvGrpSpPr>
+        <p:cNvPr id="1" name=""/>
+        <p:cNvGrpSpPr/>
+        <p:nvPr/>
+      </p:nvGrpSpPr>
+      <p:grpSpPr>
+        <a:xfrm>
+          <a:off x="0" y="0"/>
+          <a:ext cx="0" cy="0"/>
+          <a:chOff x="0" y="0"/>
+          <a:chExt cx="0" cy="0"/>
+        </a:xfrm>
+      </p:grpSpPr>
+      <p:sp>
+        <p:nvSpPr>
+          <p:cNvPr id="4" name="Rectangle 3">
+            <a:extLst>
+              <a:ext uri="{FF2B5EF4-FFF2-40B4-BE49-F238E27FC236}">
+                <a16:creationId xmlns:a16="http://schemas.microsoft.com/office/drawing/2014/main" id="{571675EC-0BAF-32C0-B50B-602795616657}"/>
+              </a:ext>
+            </a:extLst>
+          </p:cNvPr>
+          <p:cNvSpPr/>
+          <p:nvPr/>
+        </p:nvSpPr>
+        <p:spPr>
+          <a:xfrm>
+            <a:off x="3246845" y="1387586"/>
+            <a:ext cx="1525103" cy="375011"/>
+          </a:xfrm>
+          <a:prstGeom prst="rect">
+            <a:avLst/>
+          </a:prstGeom>
+          <a:solidFill>
+            <a:schemeClr val="tx2">
+              <a:lumMod val="75000"/>
+              <a:lumOff val="25000"/>
+            </a:schemeClr>
+          </a:solidFill>
+          <a:ln>
+            <a:solidFill>
+              <a:schemeClr val="tx1"/>
+            </a:solidFill>
+          </a:ln>
+        </p:spPr>
+        <p:style>
+          <a:lnRef idx="2">
+            <a:schemeClr val="accent1">
+              <a:shade val="50000"/>
+            </a:schemeClr>
+          </a:lnRef>
+          <a:fillRef idx="1">
+            <a:schemeClr val="accent1"/>
+          </a:fillRef>
+          <a:effectRef idx="0">
+            <a:schemeClr val="accent1"/>
+          </a:effectRef>
+          <a:fontRef idx="minor">
+            <a:schemeClr val="lt1"/>
+          </a:fontRef>
+        </p:style>
+        <p:txBody>
+          <a:bodyPr rtlCol="0" anchor="ctr"/>
+          <a:lstStyle/>
+          <a:p>
+            <a:r>
+              <a:rPr lang="en-US" sz="1050" b="1" dirty="0"/>
+              <a:t>PLC input hash table variables</a:t>
+            </a:r>
+            <a:endParaRPr lang="en-SG" sz="1050" b="1" dirty="0"/>
+          </a:p>
+        </p:txBody>
+      </p:sp>
+      <p:sp>
+        <p:nvSpPr>
+          <p:cNvPr id="14" name="Rectangle 13">
+            <a:extLst>
+              <a:ext uri="{FF2B5EF4-FFF2-40B4-BE49-F238E27FC236}">
+                <a16:creationId xmlns:a16="http://schemas.microsoft.com/office/drawing/2014/main" id="{52DD4F69-9A1B-C8DF-3630-108F0BEC86A5}"/>
+              </a:ext>
+            </a:extLst>
+          </p:cNvPr>
+          <p:cNvSpPr/>
+          <p:nvPr/>
+        </p:nvSpPr>
+        <p:spPr>
+          <a:xfrm>
+            <a:off x="4359691" y="2204804"/>
+            <a:ext cx="2314379" cy="375011"/>
+          </a:xfrm>
+          <a:prstGeom prst="rect">
+            <a:avLst/>
+          </a:prstGeom>
+          <a:solidFill>
+            <a:schemeClr val="tx2">
+              <a:lumMod val="75000"/>
+              <a:lumOff val="25000"/>
+            </a:schemeClr>
+          </a:solidFill>
+          <a:ln>
+            <a:solidFill>
+              <a:schemeClr val="tx1"/>
+            </a:solidFill>
+          </a:ln>
+        </p:spPr>
+        <p:style>
+          <a:lnRef idx="2">
+            <a:schemeClr val="accent1">
+              <a:shade val="50000"/>
+            </a:schemeClr>
+          </a:lnRef>
+          <a:fillRef idx="1">
+            <a:schemeClr val="accent1"/>
+          </a:fillRef>
+          <a:effectRef idx="0">
+            <a:schemeClr val="accent1"/>
+          </a:effectRef>
+          <a:fontRef idx="minor">
+            <a:schemeClr val="lt1"/>
+          </a:fontRef>
+        </p:style>
+        <p:txBody>
+          <a:bodyPr rtlCol="0" anchor="ctr"/>
+          <a:lstStyle/>
+          <a:p>
+            <a:r>
+              <a:rPr lang="en-US" sz="1050" b="1" dirty="0"/>
+              <a:t>Ladder Logic calculation module </a:t>
+            </a:r>
+            <a:endParaRPr lang="en-SG" sz="1050" b="1" dirty="0"/>
+          </a:p>
+        </p:txBody>
+      </p:sp>
+      <p:cxnSp>
+        <p:nvCxnSpPr>
+          <p:cNvPr id="16" name="Connector: Elbow 15">
+            <a:extLst>
+              <a:ext uri="{FF2B5EF4-FFF2-40B4-BE49-F238E27FC236}">
+                <a16:creationId xmlns:a16="http://schemas.microsoft.com/office/drawing/2014/main" id="{36DBB44F-6D16-4CB1-E5C5-094F3D80E0B1}"/>
+              </a:ext>
+            </a:extLst>
+          </p:cNvPr>
+          <p:cNvCxnSpPr>
+            <a:cxnSpLocks/>
+            <a:endCxn id="14" idx="0"/>
+          </p:cNvCxnSpPr>
+          <p:nvPr/>
+        </p:nvCxnSpPr>
+        <p:spPr>
+          <a:xfrm>
+            <a:off x="4771948" y="1646245"/>
+            <a:ext cx="744933" cy="558559"/>
+          </a:xfrm>
+          <a:prstGeom prst="bentConnector2">
+            <a:avLst/>
+          </a:prstGeom>
+          <a:ln>
+            <a:tailEnd type="triangle"/>
+          </a:ln>
+        </p:spPr>
+        <p:style>
+          <a:lnRef idx="2">
+            <a:schemeClr val="dk1"/>
+          </a:lnRef>
+          <a:fillRef idx="0">
+            <a:schemeClr val="dk1"/>
+          </a:fillRef>
+          <a:effectRef idx="1">
+            <a:schemeClr val="dk1"/>
+          </a:effectRef>
+          <a:fontRef idx="minor">
+            <a:schemeClr val="tx1"/>
+          </a:fontRef>
+        </p:style>
+      </p:cxnSp>
+      <p:sp>
+        <p:nvSpPr>
+          <p:cNvPr id="17" name="Rectangle 16">
+            <a:extLst>
+              <a:ext uri="{FF2B5EF4-FFF2-40B4-BE49-F238E27FC236}">
+                <a16:creationId xmlns:a16="http://schemas.microsoft.com/office/drawing/2014/main" id="{768CBE30-D3FA-8C3E-1B0F-6386226EF08C}"/>
+              </a:ext>
+            </a:extLst>
+          </p:cNvPr>
+          <p:cNvSpPr/>
+          <p:nvPr/>
+        </p:nvSpPr>
+        <p:spPr>
+          <a:xfrm>
+            <a:off x="1065186" y="1179098"/>
+            <a:ext cx="1161785" cy="307944"/>
+          </a:xfrm>
+          <a:prstGeom prst="rect">
+            <a:avLst/>
+          </a:prstGeom>
+          <a:solidFill>
+            <a:schemeClr val="tx2">
+              <a:lumMod val="75000"/>
+              <a:lumOff val="25000"/>
+            </a:schemeClr>
+          </a:solidFill>
+          <a:ln>
+            <a:solidFill>
+              <a:schemeClr val="tx1"/>
+            </a:solidFill>
+          </a:ln>
+        </p:spPr>
+        <p:style>
+          <a:lnRef idx="2">
+            <a:schemeClr val="accent1">
+              <a:shade val="50000"/>
+            </a:schemeClr>
+          </a:lnRef>
+          <a:fillRef idx="1">
+            <a:schemeClr val="accent1"/>
+          </a:fillRef>
+          <a:effectRef idx="0">
+            <a:schemeClr val="accent1"/>
+          </a:effectRef>
+          <a:fontRef idx="minor">
+            <a:schemeClr val="lt1"/>
+          </a:fontRef>
+        </p:style>
+        <p:txBody>
+          <a:bodyPr rtlCol="0" anchor="ctr"/>
+          <a:lstStyle/>
+          <a:p>
+            <a:r>
+              <a:rPr lang="en-US" sz="1050" b="1" dirty="0"/>
+              <a:t>Weather Sensor </a:t>
+            </a:r>
+            <a:endParaRPr lang="en-SG" sz="1050" b="1" dirty="0"/>
+          </a:p>
+        </p:txBody>
+      </p:sp>
+      <p:cxnSp>
+        <p:nvCxnSpPr>
+          <p:cNvPr id="18" name="Straight Arrow Connector 17">
+            <a:extLst>
+              <a:ext uri="{FF2B5EF4-FFF2-40B4-BE49-F238E27FC236}">
+                <a16:creationId xmlns:a16="http://schemas.microsoft.com/office/drawing/2014/main" id="{33A273FC-F917-1A2B-1CB4-4AA7B7590AD1}"/>
+              </a:ext>
+            </a:extLst>
+          </p:cNvPr>
+          <p:cNvCxnSpPr>
+            <a:cxnSpLocks/>
+          </p:cNvCxnSpPr>
+          <p:nvPr/>
+        </p:nvCxnSpPr>
+        <p:spPr>
+          <a:xfrm>
+            <a:off x="2492111" y="1570123"/>
+            <a:ext cx="731023" cy="0"/>
+          </a:xfrm>
+          <a:prstGeom prst="straightConnector1">
+            <a:avLst/>
+          </a:prstGeom>
+          <a:ln>
+            <a:tailEnd type="triangle"/>
+          </a:ln>
+        </p:spPr>
+        <p:style>
+          <a:lnRef idx="2">
+            <a:schemeClr val="dk1"/>
+          </a:lnRef>
+          <a:fillRef idx="0">
+            <a:schemeClr val="dk1"/>
+          </a:fillRef>
+          <a:effectRef idx="1">
+            <a:schemeClr val="dk1"/>
+          </a:effectRef>
+          <a:fontRef idx="minor">
+            <a:schemeClr val="tx1"/>
+          </a:fontRef>
+        </p:style>
+      </p:cxnSp>
+      <p:sp>
+        <p:nvSpPr>
+          <p:cNvPr id="21" name="Rectangle 20">
+            <a:extLst>
+              <a:ext uri="{FF2B5EF4-FFF2-40B4-BE49-F238E27FC236}">
+                <a16:creationId xmlns:a16="http://schemas.microsoft.com/office/drawing/2014/main" id="{42404ECD-80F5-75EE-05C2-6E6C64F9CF7C}"/>
+              </a:ext>
+            </a:extLst>
+          </p:cNvPr>
+          <p:cNvSpPr/>
+          <p:nvPr/>
+        </p:nvSpPr>
+        <p:spPr>
+          <a:xfrm>
+            <a:off x="7861129" y="2117963"/>
+            <a:ext cx="1171211" cy="375011"/>
+          </a:xfrm>
+          <a:prstGeom prst="rect">
+            <a:avLst/>
+          </a:prstGeom>
+          <a:solidFill>
+            <a:schemeClr val="tx2">
+              <a:lumMod val="75000"/>
+              <a:lumOff val="25000"/>
+            </a:schemeClr>
+          </a:solidFill>
+          <a:ln>
+            <a:solidFill>
+              <a:schemeClr val="tx1"/>
+            </a:solidFill>
+          </a:ln>
+        </p:spPr>
+        <p:style>
+          <a:lnRef idx="2">
+            <a:schemeClr val="accent1">
+              <a:shade val="50000"/>
+            </a:schemeClr>
+          </a:lnRef>
+          <a:fillRef idx="1">
+            <a:schemeClr val="accent1"/>
+          </a:fillRef>
+          <a:effectRef idx="0">
+            <a:schemeClr val="accent1"/>
+          </a:effectRef>
+          <a:fontRef idx="minor">
+            <a:schemeClr val="lt1"/>
+          </a:fontRef>
+        </p:style>
+        <p:txBody>
+          <a:bodyPr rtlCol="0" anchor="ctr"/>
+          <a:lstStyle/>
+          <a:p>
+            <a:r>
+              <a:rPr lang="en-US" sz="1050" b="1" dirty="0"/>
+              <a:t>OPC UA Server</a:t>
+            </a:r>
+            <a:endParaRPr lang="en-SG" sz="1050" b="1" dirty="0"/>
+          </a:p>
+        </p:txBody>
+      </p:sp>
+      <p:sp>
+        <p:nvSpPr>
+          <p:cNvPr id="36" name="Rectangle 35">
+            <a:extLst>
+              <a:ext uri="{FF2B5EF4-FFF2-40B4-BE49-F238E27FC236}">
+                <a16:creationId xmlns:a16="http://schemas.microsoft.com/office/drawing/2014/main" id="{240546D7-C0EB-733F-CA9F-87504E974245}"/>
+              </a:ext>
+            </a:extLst>
+          </p:cNvPr>
+          <p:cNvSpPr/>
+          <p:nvPr/>
+        </p:nvSpPr>
+        <p:spPr>
+          <a:xfrm>
+            <a:off x="1065186" y="2492974"/>
+            <a:ext cx="672174" cy="307944"/>
+          </a:xfrm>
+          <a:prstGeom prst="rect">
+            <a:avLst/>
+          </a:prstGeom>
+          <a:solidFill>
+            <a:schemeClr val="tx2">
+              <a:lumMod val="75000"/>
+              <a:lumOff val="25000"/>
+            </a:schemeClr>
+          </a:solidFill>
+          <a:ln>
+            <a:solidFill>
+              <a:schemeClr val="tx1"/>
+            </a:solidFill>
+          </a:ln>
+        </p:spPr>
+        <p:style>
+          <a:lnRef idx="2">
+            <a:schemeClr val="accent1">
+              <a:shade val="50000"/>
+            </a:schemeClr>
+          </a:lnRef>
+          <a:fillRef idx="1">
+            <a:schemeClr val="accent1"/>
+          </a:fillRef>
+          <a:effectRef idx="0">
+            <a:schemeClr val="accent1"/>
+          </a:effectRef>
+          <a:fontRef idx="minor">
+            <a:schemeClr val="lt1"/>
+          </a:fontRef>
+        </p:style>
+        <p:txBody>
+          <a:bodyPr rtlCol="0" anchor="ctr"/>
+          <a:lstStyle/>
+          <a:p>
+            <a:r>
+              <a:rPr lang="en-US" sz="1050" b="1" dirty="0"/>
+              <a:t>Plane</a:t>
+            </a:r>
+            <a:endParaRPr lang="en-SG" sz="1050" b="1" dirty="0"/>
+          </a:p>
+        </p:txBody>
+      </p:sp>
+      <p:sp>
+        <p:nvSpPr>
+          <p:cNvPr id="2" name="Rectangle 1">
+            <a:extLst>
+              <a:ext uri="{FF2B5EF4-FFF2-40B4-BE49-F238E27FC236}">
+                <a16:creationId xmlns:a16="http://schemas.microsoft.com/office/drawing/2014/main" id="{F2D89267-5C64-CEBD-1EC5-4BC32D9788BD}"/>
+              </a:ext>
+            </a:extLst>
+          </p:cNvPr>
+          <p:cNvSpPr/>
+          <p:nvPr/>
+        </p:nvSpPr>
+        <p:spPr>
+          <a:xfrm>
+            <a:off x="1065187" y="1687014"/>
+            <a:ext cx="1184566" cy="307944"/>
+          </a:xfrm>
+          <a:prstGeom prst="rect">
+            <a:avLst/>
+          </a:prstGeom>
+          <a:solidFill>
+            <a:schemeClr val="tx2">
+              <a:lumMod val="75000"/>
+              <a:lumOff val="25000"/>
+            </a:schemeClr>
+          </a:solidFill>
+          <a:ln>
+            <a:solidFill>
+              <a:schemeClr val="tx1"/>
+            </a:solidFill>
+          </a:ln>
+        </p:spPr>
+        <p:style>
+          <a:lnRef idx="2">
+            <a:schemeClr val="accent1">
+              <a:shade val="50000"/>
+            </a:schemeClr>
+          </a:lnRef>
+          <a:fillRef idx="1">
+            <a:schemeClr val="accent1"/>
+          </a:fillRef>
+          <a:effectRef idx="0">
+            <a:schemeClr val="accent1"/>
+          </a:effectRef>
+          <a:fontRef idx="minor">
+            <a:schemeClr val="lt1"/>
+          </a:fontRef>
+        </p:style>
+        <p:txBody>
+          <a:bodyPr rtlCol="0" anchor="ctr"/>
+          <a:lstStyle/>
+          <a:p>
+            <a:r>
+              <a:rPr lang="en-US" sz="1050" b="1" dirty="0"/>
+              <a:t>Weather Radar</a:t>
+            </a:r>
+            <a:endParaRPr lang="en-SG" sz="1050" b="1" dirty="0"/>
+          </a:p>
+        </p:txBody>
+      </p:sp>
+      <p:cxnSp>
+        <p:nvCxnSpPr>
+          <p:cNvPr id="5" name="Connector: Elbow 4">
+            <a:extLst>
+              <a:ext uri="{FF2B5EF4-FFF2-40B4-BE49-F238E27FC236}">
+                <a16:creationId xmlns:a16="http://schemas.microsoft.com/office/drawing/2014/main" id="{DE7529E9-DE8D-C7C4-68DC-8FC4E8170030}"/>
+              </a:ext>
+            </a:extLst>
+          </p:cNvPr>
+          <p:cNvCxnSpPr>
+            <a:cxnSpLocks/>
+            <a:stCxn id="17" idx="3"/>
+            <a:endCxn id="2" idx="3"/>
+          </p:cNvCxnSpPr>
+          <p:nvPr/>
+        </p:nvCxnSpPr>
+        <p:spPr>
+          <a:xfrm>
+            <a:off x="2226971" y="1333070"/>
+            <a:ext cx="22782" cy="507916"/>
+          </a:xfrm>
+          <a:prstGeom prst="bentConnector3">
+            <a:avLst>
+              <a:gd name="adj1" fmla="val 1103424"/>
+            </a:avLst>
+          </a:prstGeom>
+        </p:spPr>
+        <p:style>
+          <a:lnRef idx="2">
+            <a:schemeClr val="dk1"/>
+          </a:lnRef>
+          <a:fillRef idx="0">
+            <a:schemeClr val="dk1"/>
+          </a:fillRef>
+          <a:effectRef idx="1">
+            <a:schemeClr val="dk1"/>
+          </a:effectRef>
+          <a:fontRef idx="minor">
+            <a:schemeClr val="tx1"/>
+          </a:fontRef>
+        </p:style>
+      </p:cxnSp>
+      <p:cxnSp>
+        <p:nvCxnSpPr>
+          <p:cNvPr id="19" name="Straight Arrow Connector 18">
+            <a:extLst>
+              <a:ext uri="{FF2B5EF4-FFF2-40B4-BE49-F238E27FC236}">
+                <a16:creationId xmlns:a16="http://schemas.microsoft.com/office/drawing/2014/main" id="{6060D393-9BF8-CE07-F867-23FBD7630E8C}"/>
+              </a:ext>
+            </a:extLst>
+          </p:cNvPr>
+          <p:cNvCxnSpPr>
+            <a:cxnSpLocks/>
+          </p:cNvCxnSpPr>
+          <p:nvPr/>
+        </p:nvCxnSpPr>
+        <p:spPr>
+          <a:xfrm>
+            <a:off x="4771948" y="1487042"/>
+            <a:ext cx="1903172" cy="0"/>
+          </a:xfrm>
+          <a:prstGeom prst="straightConnector1">
+            <a:avLst/>
+          </a:prstGeom>
+          <a:ln>
+            <a:tailEnd type="triangle"/>
+          </a:ln>
+        </p:spPr>
+        <p:style>
+          <a:lnRef idx="2">
+            <a:schemeClr val="dk1"/>
+          </a:lnRef>
+          <a:fillRef idx="0">
+            <a:schemeClr val="dk1"/>
+          </a:fillRef>
+          <a:effectRef idx="1">
+            <a:schemeClr val="dk1"/>
+          </a:effectRef>
+          <a:fontRef idx="minor">
+            <a:schemeClr val="tx1"/>
+          </a:fontRef>
+        </p:style>
+      </p:cxnSp>
+      <p:sp>
+        <p:nvSpPr>
+          <p:cNvPr id="24" name="Rectangle 23">
+            <a:extLst>
+              <a:ext uri="{FF2B5EF4-FFF2-40B4-BE49-F238E27FC236}">
+                <a16:creationId xmlns:a16="http://schemas.microsoft.com/office/drawing/2014/main" id="{24F6E7E5-FE9B-D3FF-3203-6DFCCF261A8B}"/>
+              </a:ext>
+            </a:extLst>
+          </p:cNvPr>
+          <p:cNvSpPr/>
+          <p:nvPr/>
+        </p:nvSpPr>
+        <p:spPr>
+          <a:xfrm>
+            <a:off x="6675120" y="1312003"/>
+            <a:ext cx="1421867" cy="375011"/>
+          </a:xfrm>
+          <a:prstGeom prst="rect">
+            <a:avLst/>
+          </a:prstGeom>
+          <a:solidFill>
+            <a:schemeClr val="tx2">
+              <a:lumMod val="75000"/>
+              <a:lumOff val="25000"/>
+            </a:schemeClr>
+          </a:solidFill>
+          <a:ln>
+            <a:solidFill>
+              <a:schemeClr val="tx1"/>
+            </a:solidFill>
+          </a:ln>
+        </p:spPr>
+        <p:style>
+          <a:lnRef idx="2">
+            <a:schemeClr val="accent1">
+              <a:shade val="50000"/>
+            </a:schemeClr>
+          </a:lnRef>
+          <a:fillRef idx="1">
+            <a:schemeClr val="accent1"/>
+          </a:fillRef>
+          <a:effectRef idx="0">
+            <a:schemeClr val="accent1"/>
+          </a:effectRef>
+          <a:fontRef idx="minor">
+            <a:schemeClr val="lt1"/>
+          </a:fontRef>
+        </p:style>
+        <p:txBody>
+          <a:bodyPr rtlCol="0" anchor="ctr"/>
+          <a:lstStyle/>
+          <a:p>
+            <a:r>
+              <a:rPr lang="en-US" sz="1050" b="1" dirty="0"/>
+              <a:t>UA data structure variable </a:t>
+            </a:r>
+            <a:endParaRPr lang="en-SG" sz="1050" b="1" dirty="0"/>
+          </a:p>
+        </p:txBody>
+      </p:sp>
+      <p:sp>
+        <p:nvSpPr>
+          <p:cNvPr id="32" name="Rectangle 31">
+            <a:extLst>
+              <a:ext uri="{FF2B5EF4-FFF2-40B4-BE49-F238E27FC236}">
+                <a16:creationId xmlns:a16="http://schemas.microsoft.com/office/drawing/2014/main" id="{E36BBBF2-412D-0A89-0F92-E88C3514FAB3}"/>
+              </a:ext>
+            </a:extLst>
+          </p:cNvPr>
+          <p:cNvSpPr/>
+          <p:nvPr/>
+        </p:nvSpPr>
+        <p:spPr>
+          <a:xfrm>
+            <a:off x="3246845" y="2954431"/>
+            <a:ext cx="1525103" cy="375011"/>
+          </a:xfrm>
+          <a:prstGeom prst="rect">
+            <a:avLst/>
+          </a:prstGeom>
+          <a:solidFill>
+            <a:schemeClr val="tx2">
+              <a:lumMod val="75000"/>
+              <a:lumOff val="25000"/>
+            </a:schemeClr>
+          </a:solidFill>
+          <a:ln>
+            <a:solidFill>
+              <a:schemeClr val="tx1"/>
+            </a:solidFill>
+          </a:ln>
+        </p:spPr>
+        <p:style>
+          <a:lnRef idx="2">
+            <a:schemeClr val="accent1">
+              <a:shade val="50000"/>
+            </a:schemeClr>
+          </a:lnRef>
+          <a:fillRef idx="1">
+            <a:schemeClr val="accent1"/>
+          </a:fillRef>
+          <a:effectRef idx="0">
+            <a:schemeClr val="accent1"/>
+          </a:effectRef>
+          <a:fontRef idx="minor">
+            <a:schemeClr val="lt1"/>
+          </a:fontRef>
+        </p:style>
+        <p:txBody>
+          <a:bodyPr rtlCol="0" anchor="ctr"/>
+          <a:lstStyle/>
+          <a:p>
+            <a:r>
+              <a:rPr lang="en-US" sz="1050" b="1" dirty="0"/>
+              <a:t>PLC input hash table variables</a:t>
+            </a:r>
+            <a:endParaRPr lang="en-SG" sz="1050" b="1" dirty="0"/>
+          </a:p>
+        </p:txBody>
+      </p:sp>
+      <p:cxnSp>
+        <p:nvCxnSpPr>
+          <p:cNvPr id="35" name="Connector: Elbow 34">
+            <a:extLst>
+              <a:ext uri="{FF2B5EF4-FFF2-40B4-BE49-F238E27FC236}">
+                <a16:creationId xmlns:a16="http://schemas.microsoft.com/office/drawing/2014/main" id="{B5C86241-053D-5EA6-3081-FFEC4CD14046}"/>
+              </a:ext>
+            </a:extLst>
+          </p:cNvPr>
+          <p:cNvCxnSpPr>
+            <a:cxnSpLocks/>
+            <a:stCxn id="14" idx="2"/>
+          </p:cNvCxnSpPr>
+          <p:nvPr/>
+        </p:nvCxnSpPr>
+        <p:spPr>
+          <a:xfrm rot="5400000">
+            <a:off x="4923312" y="2428452"/>
+            <a:ext cx="442207" cy="744933"/>
+          </a:xfrm>
+          <a:prstGeom prst="bentConnector2">
+            <a:avLst/>
+          </a:prstGeom>
+          <a:ln>
+            <a:tailEnd type="triangle"/>
+          </a:ln>
+        </p:spPr>
+        <p:style>
+          <a:lnRef idx="2">
+            <a:schemeClr val="dk1"/>
+          </a:lnRef>
+          <a:fillRef idx="0">
+            <a:schemeClr val="dk1"/>
+          </a:fillRef>
+          <a:effectRef idx="1">
+            <a:schemeClr val="dk1"/>
+          </a:effectRef>
+          <a:fontRef idx="minor">
+            <a:schemeClr val="tx1"/>
+          </a:fontRef>
+        </p:style>
+      </p:cxnSp>
+      <p:cxnSp>
+        <p:nvCxnSpPr>
+          <p:cNvPr id="40" name="Straight Arrow Connector 39">
+            <a:extLst>
+              <a:ext uri="{FF2B5EF4-FFF2-40B4-BE49-F238E27FC236}">
+                <a16:creationId xmlns:a16="http://schemas.microsoft.com/office/drawing/2014/main" id="{346FFA20-69E2-6B81-9530-B30D4DBBD879}"/>
+              </a:ext>
+            </a:extLst>
+          </p:cNvPr>
+          <p:cNvCxnSpPr>
+            <a:cxnSpLocks/>
+          </p:cNvCxnSpPr>
+          <p:nvPr/>
+        </p:nvCxnSpPr>
+        <p:spPr>
+          <a:xfrm>
+            <a:off x="4793284" y="3229410"/>
+            <a:ext cx="1903172" cy="0"/>
+          </a:xfrm>
+          <a:prstGeom prst="straightConnector1">
+            <a:avLst/>
+          </a:prstGeom>
+          <a:ln>
+            <a:tailEnd type="triangle"/>
+          </a:ln>
+        </p:spPr>
+        <p:style>
+          <a:lnRef idx="2">
+            <a:schemeClr val="dk1"/>
+          </a:lnRef>
+          <a:fillRef idx="0">
+            <a:schemeClr val="dk1"/>
+          </a:fillRef>
+          <a:effectRef idx="1">
+            <a:schemeClr val="dk1"/>
+          </a:effectRef>
+          <a:fontRef idx="minor">
+            <a:schemeClr val="tx1"/>
+          </a:fontRef>
+        </p:style>
+      </p:cxnSp>
+      <p:cxnSp>
+        <p:nvCxnSpPr>
+          <p:cNvPr id="41" name="Straight Arrow Connector 40">
+            <a:extLst>
+              <a:ext uri="{FF2B5EF4-FFF2-40B4-BE49-F238E27FC236}">
+                <a16:creationId xmlns:a16="http://schemas.microsoft.com/office/drawing/2014/main" id="{210524C7-F4CD-F7AB-1821-555F2C4744FF}"/>
+              </a:ext>
+            </a:extLst>
+          </p:cNvPr>
+          <p:cNvCxnSpPr>
+            <a:cxnSpLocks/>
+          </p:cNvCxnSpPr>
+          <p:nvPr/>
+        </p:nvCxnSpPr>
+        <p:spPr>
+          <a:xfrm flipH="1">
+            <a:off x="2409403" y="3141936"/>
+            <a:ext cx="837442" cy="0"/>
+          </a:xfrm>
+          <a:prstGeom prst="straightConnector1">
+            <a:avLst/>
+          </a:prstGeom>
+          <a:ln>
+            <a:tailEnd type="triangle"/>
+          </a:ln>
+        </p:spPr>
+        <p:style>
+          <a:lnRef idx="2">
+            <a:schemeClr val="dk1"/>
+          </a:lnRef>
+          <a:fillRef idx="0">
+            <a:schemeClr val="dk1"/>
+          </a:fillRef>
+          <a:effectRef idx="1">
+            <a:schemeClr val="dk1"/>
+          </a:effectRef>
+          <a:fontRef idx="minor">
+            <a:schemeClr val="tx1"/>
+          </a:fontRef>
+        </p:style>
+      </p:cxnSp>
+      <p:sp>
+        <p:nvSpPr>
+          <p:cNvPr id="44" name="Rectangle 43">
+            <a:extLst>
+              <a:ext uri="{FF2B5EF4-FFF2-40B4-BE49-F238E27FC236}">
+                <a16:creationId xmlns:a16="http://schemas.microsoft.com/office/drawing/2014/main" id="{E6BD78A6-7E95-3C8F-5DD4-B3C06BB741D9}"/>
+              </a:ext>
+            </a:extLst>
+          </p:cNvPr>
+          <p:cNvSpPr/>
+          <p:nvPr/>
+        </p:nvSpPr>
+        <p:spPr>
+          <a:xfrm>
+            <a:off x="1065186" y="3022022"/>
+            <a:ext cx="1322881" cy="307944"/>
+          </a:xfrm>
+          <a:prstGeom prst="rect">
+            <a:avLst/>
+          </a:prstGeom>
+          <a:solidFill>
+            <a:schemeClr val="tx2">
+              <a:lumMod val="75000"/>
+              <a:lumOff val="25000"/>
+            </a:schemeClr>
+          </a:solidFill>
+          <a:ln>
+            <a:solidFill>
+              <a:schemeClr val="tx1"/>
+            </a:solidFill>
+          </a:ln>
+        </p:spPr>
+        <p:style>
+          <a:lnRef idx="2">
+            <a:schemeClr val="accent1">
+              <a:shade val="50000"/>
+            </a:schemeClr>
+          </a:lnRef>
+          <a:fillRef idx="1">
+            <a:schemeClr val="accent1"/>
+          </a:fillRef>
+          <a:effectRef idx="0">
+            <a:schemeClr val="accent1"/>
+          </a:effectRef>
+          <a:fontRef idx="minor">
+            <a:schemeClr val="lt1"/>
+          </a:fontRef>
+        </p:style>
+        <p:txBody>
+          <a:bodyPr rtlCol="0" anchor="ctr"/>
+          <a:lstStyle/>
+          <a:p>
+            <a:r>
+              <a:rPr lang="en-US" sz="1050" b="1" dirty="0"/>
+              <a:t>ADS-B antenna </a:t>
+            </a:r>
+            <a:endParaRPr lang="en-SG" sz="1050" b="1" dirty="0"/>
+          </a:p>
+        </p:txBody>
+      </p:sp>
+      <p:cxnSp>
+        <p:nvCxnSpPr>
+          <p:cNvPr id="45" name="Straight Arrow Connector 44">
+            <a:extLst>
+              <a:ext uri="{FF2B5EF4-FFF2-40B4-BE49-F238E27FC236}">
+                <a16:creationId xmlns:a16="http://schemas.microsoft.com/office/drawing/2014/main" id="{CD164133-C45C-6E22-76BD-2F63A75314A8}"/>
+              </a:ext>
+            </a:extLst>
+          </p:cNvPr>
+          <p:cNvCxnSpPr>
+            <a:cxnSpLocks/>
+          </p:cNvCxnSpPr>
+          <p:nvPr/>
+        </p:nvCxnSpPr>
+        <p:spPr>
+          <a:xfrm flipV="1">
+            <a:off x="1320497" y="2800918"/>
+            <a:ext cx="0" cy="212808"/>
+          </a:xfrm>
+          <a:prstGeom prst="straightConnector1">
+            <a:avLst/>
+          </a:prstGeom>
+          <a:ln>
+            <a:tailEnd type="triangle"/>
+          </a:ln>
+        </p:spPr>
+        <p:style>
+          <a:lnRef idx="2">
+            <a:schemeClr val="dk1"/>
+          </a:lnRef>
+          <a:fillRef idx="0">
+            <a:schemeClr val="dk1"/>
+          </a:fillRef>
+          <a:effectRef idx="1">
+            <a:schemeClr val="dk1"/>
+          </a:effectRef>
+          <a:fontRef idx="minor">
+            <a:schemeClr val="tx1"/>
+          </a:fontRef>
+        </p:style>
+      </p:cxnSp>
+      <p:sp>
+        <p:nvSpPr>
+          <p:cNvPr id="47" name="Rectangle 46">
+            <a:extLst>
+              <a:ext uri="{FF2B5EF4-FFF2-40B4-BE49-F238E27FC236}">
+                <a16:creationId xmlns:a16="http://schemas.microsoft.com/office/drawing/2014/main" id="{708FFD17-62AE-70EC-4096-89001700CFC3}"/>
+              </a:ext>
+            </a:extLst>
+          </p:cNvPr>
+          <p:cNvSpPr/>
+          <p:nvPr/>
+        </p:nvSpPr>
+        <p:spPr>
+          <a:xfrm>
+            <a:off x="6717792" y="2988488"/>
+            <a:ext cx="1421867" cy="375011"/>
+          </a:xfrm>
+          <a:prstGeom prst="rect">
+            <a:avLst/>
+          </a:prstGeom>
+          <a:solidFill>
+            <a:schemeClr val="tx2">
+              <a:lumMod val="75000"/>
+              <a:lumOff val="25000"/>
+            </a:schemeClr>
+          </a:solidFill>
+          <a:ln>
+            <a:solidFill>
+              <a:schemeClr val="tx1"/>
+            </a:solidFill>
+          </a:ln>
+        </p:spPr>
+        <p:style>
+          <a:lnRef idx="2">
+            <a:schemeClr val="accent1">
+              <a:shade val="50000"/>
+            </a:schemeClr>
+          </a:lnRef>
+          <a:fillRef idx="1">
+            <a:schemeClr val="accent1"/>
+          </a:fillRef>
+          <a:effectRef idx="0">
+            <a:schemeClr val="accent1"/>
+          </a:effectRef>
+          <a:fontRef idx="minor">
+            <a:schemeClr val="lt1"/>
+          </a:fontRef>
+        </p:style>
+        <p:txBody>
+          <a:bodyPr rtlCol="0" anchor="ctr"/>
+          <a:lstStyle/>
+          <a:p>
+            <a:r>
+              <a:rPr lang="en-US" sz="1050" b="1" dirty="0"/>
+              <a:t>UA data structure variable </a:t>
+            </a:r>
+            <a:endParaRPr lang="en-SG" sz="1050" b="1" dirty="0"/>
+          </a:p>
+        </p:txBody>
+      </p:sp>
+      <p:cxnSp>
+        <p:nvCxnSpPr>
+          <p:cNvPr id="48" name="Connector: Elbow 47">
+            <a:extLst>
+              <a:ext uri="{FF2B5EF4-FFF2-40B4-BE49-F238E27FC236}">
+                <a16:creationId xmlns:a16="http://schemas.microsoft.com/office/drawing/2014/main" id="{2AE3F88D-DF42-A8ED-6CD6-9589B84673C9}"/>
+              </a:ext>
+            </a:extLst>
+          </p:cNvPr>
+          <p:cNvCxnSpPr>
+            <a:cxnSpLocks/>
+            <a:stCxn id="24" idx="2"/>
+            <a:endCxn id="21" idx="0"/>
+          </p:cNvCxnSpPr>
+          <p:nvPr/>
+        </p:nvCxnSpPr>
+        <p:spPr>
+          <a:xfrm rot="16200000" flipH="1">
+            <a:off x="7700920" y="1372147"/>
+            <a:ext cx="430949" cy="1060681"/>
+          </a:xfrm>
+          <a:prstGeom prst="bentConnector3">
+            <a:avLst>
+              <a:gd name="adj1" fmla="val 50000"/>
+            </a:avLst>
+          </a:prstGeom>
+          <a:ln>
+            <a:tailEnd type="triangle"/>
+          </a:ln>
+        </p:spPr>
+        <p:style>
+          <a:lnRef idx="2">
+            <a:schemeClr val="dk1"/>
+          </a:lnRef>
+          <a:fillRef idx="0">
+            <a:schemeClr val="dk1"/>
+          </a:fillRef>
+          <a:effectRef idx="1">
+            <a:schemeClr val="dk1"/>
+          </a:effectRef>
+          <a:fontRef idx="minor">
+            <a:schemeClr val="tx1"/>
+          </a:fontRef>
+        </p:style>
+      </p:cxnSp>
+      <p:cxnSp>
+        <p:nvCxnSpPr>
+          <p:cNvPr id="51" name="Connector: Elbow 50">
+            <a:extLst>
+              <a:ext uri="{FF2B5EF4-FFF2-40B4-BE49-F238E27FC236}">
+                <a16:creationId xmlns:a16="http://schemas.microsoft.com/office/drawing/2014/main" id="{9258463F-E708-EA87-AC67-C843FD1D9B54}"/>
+              </a:ext>
+            </a:extLst>
+          </p:cNvPr>
+          <p:cNvCxnSpPr>
+            <a:cxnSpLocks/>
+            <a:stCxn id="47" idx="0"/>
+            <a:endCxn id="21" idx="2"/>
+          </p:cNvCxnSpPr>
+          <p:nvPr/>
+        </p:nvCxnSpPr>
+        <p:spPr>
+          <a:xfrm rot="5400000" flipH="1" flipV="1">
+            <a:off x="7689973" y="2231727"/>
+            <a:ext cx="495514" cy="1018009"/>
+          </a:xfrm>
+          <a:prstGeom prst="bentConnector3">
+            <a:avLst>
+              <a:gd name="adj1" fmla="val 50000"/>
+            </a:avLst>
+          </a:prstGeom>
+          <a:ln>
+            <a:tailEnd type="triangle"/>
+          </a:ln>
+        </p:spPr>
+        <p:style>
+          <a:lnRef idx="2">
+            <a:schemeClr val="dk1"/>
+          </a:lnRef>
+          <a:fillRef idx="0">
+            <a:schemeClr val="dk1"/>
+          </a:fillRef>
+          <a:effectRef idx="1">
+            <a:schemeClr val="dk1"/>
+          </a:effectRef>
+          <a:fontRef idx="minor">
+            <a:schemeClr val="tx1"/>
+          </a:fontRef>
+        </p:style>
+      </p:cxnSp>
+      <p:sp>
+        <p:nvSpPr>
+          <p:cNvPr id="54" name="Rectangle 53">
+            <a:extLst>
+              <a:ext uri="{FF2B5EF4-FFF2-40B4-BE49-F238E27FC236}">
+                <a16:creationId xmlns:a16="http://schemas.microsoft.com/office/drawing/2014/main" id="{53667102-D0AE-4021-CA7E-A07037310B78}"/>
+              </a:ext>
+            </a:extLst>
+          </p:cNvPr>
+          <p:cNvSpPr/>
+          <p:nvPr/>
+        </p:nvSpPr>
+        <p:spPr>
+          <a:xfrm>
+            <a:off x="9730302" y="2117963"/>
+            <a:ext cx="1171211" cy="375011"/>
+          </a:xfrm>
+          <a:prstGeom prst="rect">
+            <a:avLst/>
+          </a:prstGeom>
+          <a:solidFill>
+            <a:schemeClr val="tx2">
+              <a:lumMod val="75000"/>
+              <a:lumOff val="25000"/>
+            </a:schemeClr>
+          </a:solidFill>
+          <a:ln>
+            <a:solidFill>
+              <a:schemeClr val="tx1"/>
+            </a:solidFill>
+          </a:ln>
+        </p:spPr>
+        <p:style>
+          <a:lnRef idx="2">
+            <a:schemeClr val="accent1">
+              <a:shade val="50000"/>
+            </a:schemeClr>
+          </a:lnRef>
+          <a:fillRef idx="1">
+            <a:schemeClr val="accent1"/>
+          </a:fillRef>
+          <a:effectRef idx="0">
+            <a:schemeClr val="accent1"/>
+          </a:effectRef>
+          <a:fontRef idx="minor">
+            <a:schemeClr val="lt1"/>
+          </a:fontRef>
+        </p:style>
+        <p:txBody>
+          <a:bodyPr rtlCol="0" anchor="ctr"/>
+          <a:lstStyle/>
+          <a:p>
+            <a:r>
+              <a:rPr lang="en-US" sz="1050" b="1" dirty="0"/>
+              <a:t>OPC UA Client</a:t>
+            </a:r>
+            <a:endParaRPr lang="en-SG" sz="1050" b="1" dirty="0"/>
+          </a:p>
+        </p:txBody>
+      </p:sp>
+      <p:cxnSp>
+        <p:nvCxnSpPr>
+          <p:cNvPr id="55" name="Straight Arrow Connector 54">
+            <a:extLst>
+              <a:ext uri="{FF2B5EF4-FFF2-40B4-BE49-F238E27FC236}">
+                <a16:creationId xmlns:a16="http://schemas.microsoft.com/office/drawing/2014/main" id="{E8BFF255-3827-161F-6836-A309515214D7}"/>
+              </a:ext>
+            </a:extLst>
+          </p:cNvPr>
+          <p:cNvCxnSpPr>
+            <a:cxnSpLocks/>
+            <a:stCxn id="21" idx="3"/>
+            <a:endCxn id="54" idx="1"/>
+          </p:cNvCxnSpPr>
+          <p:nvPr/>
+        </p:nvCxnSpPr>
+        <p:spPr>
+          <a:xfrm>
+            <a:off x="9032340" y="2305469"/>
+            <a:ext cx="697962" cy="0"/>
+          </a:xfrm>
+          <a:prstGeom prst="straightConnector1">
+            <a:avLst/>
+          </a:prstGeom>
+          <a:ln>
+            <a:tailEnd type="triangle"/>
+          </a:ln>
+        </p:spPr>
+        <p:style>
+          <a:lnRef idx="2">
+            <a:schemeClr val="dk1"/>
+          </a:lnRef>
+          <a:fillRef idx="0">
+            <a:schemeClr val="dk1"/>
+          </a:fillRef>
+          <a:effectRef idx="1">
+            <a:schemeClr val="dk1"/>
+          </a:effectRef>
+          <a:fontRef idx="minor">
+            <a:schemeClr val="tx1"/>
+          </a:fontRef>
+        </p:style>
+      </p:cxnSp>
+      <p:sp>
+        <p:nvSpPr>
+          <p:cNvPr id="59" name="Rectangle 58">
+            <a:extLst>
+              <a:ext uri="{FF2B5EF4-FFF2-40B4-BE49-F238E27FC236}">
+                <a16:creationId xmlns:a16="http://schemas.microsoft.com/office/drawing/2014/main" id="{9F92C80D-71D8-E84F-62D8-DE7BCBCEE867}"/>
+              </a:ext>
+            </a:extLst>
+          </p:cNvPr>
+          <p:cNvSpPr/>
+          <p:nvPr/>
+        </p:nvSpPr>
+        <p:spPr>
+          <a:xfrm>
+            <a:off x="9699889" y="1333070"/>
+            <a:ext cx="1171211" cy="375011"/>
+          </a:xfrm>
+          <a:prstGeom prst="rect">
+            <a:avLst/>
+          </a:prstGeom>
+          <a:solidFill>
+            <a:schemeClr val="tx2">
+              <a:lumMod val="75000"/>
+              <a:lumOff val="25000"/>
+            </a:schemeClr>
+          </a:solidFill>
+          <a:ln>
+            <a:solidFill>
+              <a:schemeClr val="tx1"/>
+            </a:solidFill>
+          </a:ln>
+        </p:spPr>
+        <p:style>
+          <a:lnRef idx="2">
+            <a:schemeClr val="accent1">
+              <a:shade val="50000"/>
+            </a:schemeClr>
+          </a:lnRef>
+          <a:fillRef idx="1">
+            <a:schemeClr val="accent1"/>
+          </a:fillRef>
+          <a:effectRef idx="0">
+            <a:schemeClr val="accent1"/>
+          </a:effectRef>
+          <a:fontRef idx="minor">
+            <a:schemeClr val="lt1"/>
+          </a:fontRef>
+        </p:style>
+        <p:txBody>
+          <a:bodyPr rtlCol="0" anchor="ctr"/>
+          <a:lstStyle/>
+          <a:p>
+            <a:r>
+              <a:rPr lang="en-US" sz="1050" b="1" dirty="0"/>
+              <a:t>Tower HMI</a:t>
+            </a:r>
+            <a:endParaRPr lang="en-SG" sz="1050" b="1" dirty="0"/>
+          </a:p>
+        </p:txBody>
+      </p:sp>
+      <p:cxnSp>
+        <p:nvCxnSpPr>
+          <p:cNvPr id="60" name="Straight Arrow Connector 59">
+            <a:extLst>
+              <a:ext uri="{FF2B5EF4-FFF2-40B4-BE49-F238E27FC236}">
+                <a16:creationId xmlns:a16="http://schemas.microsoft.com/office/drawing/2014/main" id="{94756C74-689F-38CD-99BF-42EDE105262B}"/>
+              </a:ext>
+            </a:extLst>
+          </p:cNvPr>
+          <p:cNvCxnSpPr>
+            <a:cxnSpLocks/>
+          </p:cNvCxnSpPr>
+          <p:nvPr/>
+        </p:nvCxnSpPr>
+        <p:spPr>
+          <a:xfrm flipV="1">
+            <a:off x="10236659" y="1708081"/>
+            <a:ext cx="0" cy="391722"/>
+          </a:xfrm>
+          <a:prstGeom prst="straightConnector1">
+            <a:avLst/>
+          </a:prstGeom>
+          <a:ln>
+            <a:tailEnd type="triangle"/>
+          </a:ln>
+        </p:spPr>
+        <p:style>
+          <a:lnRef idx="2">
+            <a:schemeClr val="dk1"/>
+          </a:lnRef>
+          <a:fillRef idx="0">
+            <a:schemeClr val="dk1"/>
+          </a:fillRef>
+          <a:effectRef idx="1">
+            <a:schemeClr val="dk1"/>
+          </a:effectRef>
+          <a:fontRef idx="minor">
+            <a:schemeClr val="tx1"/>
+          </a:fontRef>
+        </p:style>
+      </p:cxnSp>
+      <p:sp>
+        <p:nvSpPr>
+          <p:cNvPr id="62" name="Rectangle 61">
+            <a:extLst>
+              <a:ext uri="{FF2B5EF4-FFF2-40B4-BE49-F238E27FC236}">
+                <a16:creationId xmlns:a16="http://schemas.microsoft.com/office/drawing/2014/main" id="{6C0E9CC4-BEA5-B33B-82CB-6A6DE2D0B5AC}"/>
+              </a:ext>
+            </a:extLst>
+          </p:cNvPr>
+          <p:cNvSpPr/>
+          <p:nvPr/>
+        </p:nvSpPr>
+        <p:spPr>
+          <a:xfrm>
+            <a:off x="9784462" y="2954430"/>
+            <a:ext cx="1171211" cy="375011"/>
+          </a:xfrm>
+          <a:prstGeom prst="rect">
+            <a:avLst/>
+          </a:prstGeom>
+          <a:solidFill>
+            <a:schemeClr val="tx2">
+              <a:lumMod val="75000"/>
+              <a:lumOff val="25000"/>
+            </a:schemeClr>
+          </a:solidFill>
+          <a:ln>
+            <a:solidFill>
+              <a:schemeClr val="tx1"/>
+            </a:solidFill>
+          </a:ln>
+        </p:spPr>
+        <p:style>
+          <a:lnRef idx="2">
+            <a:schemeClr val="accent1">
+              <a:shade val="50000"/>
+            </a:schemeClr>
+          </a:lnRef>
+          <a:fillRef idx="1">
+            <a:schemeClr val="accent1"/>
+          </a:fillRef>
+          <a:effectRef idx="0">
+            <a:schemeClr val="accent1"/>
+          </a:effectRef>
+          <a:fontRef idx="minor">
+            <a:schemeClr val="lt1"/>
+          </a:fontRef>
+        </p:style>
+        <p:txBody>
+          <a:bodyPr rtlCol="0" anchor="ctr"/>
+          <a:lstStyle/>
+          <a:p>
+            <a:r>
+              <a:rPr lang="en-US" sz="1050" b="1" dirty="0"/>
+              <a:t>Raw Data Base</a:t>
+            </a:r>
+            <a:endParaRPr lang="en-SG" sz="1050" b="1" dirty="0"/>
+          </a:p>
+        </p:txBody>
+      </p:sp>
+      <p:cxnSp>
+        <p:nvCxnSpPr>
+          <p:cNvPr id="63" name="Straight Arrow Connector 62">
+            <a:extLst>
+              <a:ext uri="{FF2B5EF4-FFF2-40B4-BE49-F238E27FC236}">
+                <a16:creationId xmlns:a16="http://schemas.microsoft.com/office/drawing/2014/main" id="{B05869A0-843A-C03F-B1ED-34B464184E68}"/>
+              </a:ext>
+            </a:extLst>
+          </p:cNvPr>
+          <p:cNvCxnSpPr>
+            <a:cxnSpLocks/>
+          </p:cNvCxnSpPr>
+          <p:nvPr/>
+        </p:nvCxnSpPr>
+        <p:spPr>
+          <a:xfrm flipH="1">
+            <a:off x="10254947" y="2492974"/>
+            <a:ext cx="0" cy="409882"/>
+          </a:xfrm>
+          <a:prstGeom prst="straightConnector1">
+            <a:avLst/>
+          </a:prstGeom>
+          <a:ln>
+            <a:tailEnd type="triangle"/>
+          </a:ln>
+        </p:spPr>
+        <p:style>
+          <a:lnRef idx="2">
+            <a:schemeClr val="dk1"/>
+          </a:lnRef>
+          <a:fillRef idx="0">
+            <a:schemeClr val="dk1"/>
+          </a:fillRef>
+          <a:effectRef idx="1">
+            <a:schemeClr val="dk1"/>
+          </a:effectRef>
+          <a:fontRef idx="minor">
+            <a:schemeClr val="tx1"/>
+          </a:fontRef>
+        </p:style>
+      </p:cxnSp>
+      <p:sp>
+        <p:nvSpPr>
+          <p:cNvPr id="67" name="Oval 66">
+            <a:extLst>
+              <a:ext uri="{FF2B5EF4-FFF2-40B4-BE49-F238E27FC236}">
+                <a16:creationId xmlns:a16="http://schemas.microsoft.com/office/drawing/2014/main" id="{70110136-CD70-6B13-AC46-4F18120F245B}"/>
+              </a:ext>
+            </a:extLst>
+          </p:cNvPr>
+          <p:cNvSpPr/>
+          <p:nvPr/>
+        </p:nvSpPr>
+        <p:spPr>
+          <a:xfrm>
+            <a:off x="2655907" y="1379978"/>
+            <a:ext cx="198642" cy="214127"/>
+          </a:xfrm>
+          <a:prstGeom prst="ellipse">
+            <a:avLst/>
+          </a:prstGeom>
+          <a:solidFill>
+            <a:srgbClr val="FFC000"/>
+          </a:solidFill>
+        </p:spPr>
+        <p:style>
+          <a:lnRef idx="2">
+            <a:schemeClr val="accent1">
+              <a:shade val="15000"/>
+            </a:schemeClr>
+          </a:lnRef>
+          <a:fillRef idx="1">
+            <a:schemeClr val="accent1"/>
+          </a:fillRef>
+          <a:effectRef idx="0">
+            <a:schemeClr val="accent1"/>
+          </a:effectRef>
+          <a:fontRef idx="minor">
+            <a:schemeClr val="lt1"/>
+          </a:fontRef>
+        </p:style>
+        <p:txBody>
+          <a:bodyPr rtlCol="0" anchor="ctr"/>
+          <a:lstStyle/>
+          <a:p>
+            <a:pPr algn="ctr"/>
+            <a:r>
+              <a:rPr lang="en-SG" sz="1600" b="1" dirty="0">
+                <a:solidFill>
+                  <a:srgbClr val="C00000"/>
+                </a:solidFill>
+              </a:rPr>
+              <a:t>1</a:t>
+            </a:r>
+          </a:p>
+        </p:txBody>
+      </p:sp>
+      <p:sp>
+        <p:nvSpPr>
+          <p:cNvPr id="68" name="Oval 67">
+            <a:extLst>
+              <a:ext uri="{FF2B5EF4-FFF2-40B4-BE49-F238E27FC236}">
+                <a16:creationId xmlns:a16="http://schemas.microsoft.com/office/drawing/2014/main" id="{9827D954-0DF1-8AD2-1F5E-88698408D93D}"/>
+              </a:ext>
+            </a:extLst>
+          </p:cNvPr>
+          <p:cNvSpPr/>
+          <p:nvPr/>
+        </p:nvSpPr>
+        <p:spPr>
+          <a:xfrm>
+            <a:off x="5164244" y="1570312"/>
+            <a:ext cx="198642" cy="214127"/>
+          </a:xfrm>
+          <a:prstGeom prst="ellipse">
+            <a:avLst/>
+          </a:prstGeom>
+          <a:solidFill>
+            <a:srgbClr val="FFC000"/>
+          </a:solidFill>
+        </p:spPr>
+        <p:style>
+          <a:lnRef idx="2">
+            <a:schemeClr val="accent1">
+              <a:shade val="15000"/>
+            </a:schemeClr>
+          </a:lnRef>
+          <a:fillRef idx="1">
+            <a:schemeClr val="accent1"/>
+          </a:fillRef>
+          <a:effectRef idx="0">
+            <a:schemeClr val="accent1"/>
+          </a:effectRef>
+          <a:fontRef idx="minor">
+            <a:schemeClr val="lt1"/>
+          </a:fontRef>
+        </p:style>
+        <p:txBody>
+          <a:bodyPr rtlCol="0" anchor="ctr"/>
+          <a:lstStyle/>
+          <a:p>
+            <a:pPr algn="ctr"/>
+            <a:r>
+              <a:rPr lang="en-US" sz="1600" b="1" dirty="0">
+                <a:solidFill>
+                  <a:srgbClr val="C00000"/>
+                </a:solidFill>
+              </a:rPr>
+              <a:t>2</a:t>
+            </a:r>
+            <a:endParaRPr lang="en-SG" sz="1600" b="1" dirty="0">
+              <a:solidFill>
+                <a:srgbClr val="C00000"/>
+              </a:solidFill>
+            </a:endParaRPr>
+          </a:p>
+        </p:txBody>
+      </p:sp>
+      <p:sp>
+        <p:nvSpPr>
+          <p:cNvPr id="69" name="Oval 68">
+            <a:extLst>
+              <a:ext uri="{FF2B5EF4-FFF2-40B4-BE49-F238E27FC236}">
+                <a16:creationId xmlns:a16="http://schemas.microsoft.com/office/drawing/2014/main" id="{F37E0436-0E40-E576-EF61-2A87DD7B8182}"/>
+              </a:ext>
+            </a:extLst>
+          </p:cNvPr>
+          <p:cNvSpPr/>
+          <p:nvPr/>
+        </p:nvSpPr>
+        <p:spPr>
+          <a:xfrm>
+            <a:off x="5820361" y="1387586"/>
+            <a:ext cx="198642" cy="214127"/>
+          </a:xfrm>
+          <a:prstGeom prst="ellipse">
+            <a:avLst/>
+          </a:prstGeom>
+          <a:solidFill>
+            <a:srgbClr val="FFC000"/>
+          </a:solidFill>
+        </p:spPr>
+        <p:style>
+          <a:lnRef idx="2">
+            <a:schemeClr val="accent1">
+              <a:shade val="15000"/>
+            </a:schemeClr>
+          </a:lnRef>
+          <a:fillRef idx="1">
+            <a:schemeClr val="accent1"/>
+          </a:fillRef>
+          <a:effectRef idx="0">
+            <a:schemeClr val="accent1"/>
+          </a:effectRef>
+          <a:fontRef idx="minor">
+            <a:schemeClr val="lt1"/>
+          </a:fontRef>
+        </p:style>
+        <p:txBody>
+          <a:bodyPr rtlCol="0" anchor="ctr"/>
+          <a:lstStyle/>
+          <a:p>
+            <a:pPr algn="ctr"/>
+            <a:r>
+              <a:rPr lang="en-US" sz="1600" b="1" dirty="0">
+                <a:solidFill>
+                  <a:srgbClr val="C00000"/>
+                </a:solidFill>
+              </a:rPr>
+              <a:t>3</a:t>
+            </a:r>
+            <a:endParaRPr lang="en-SG" sz="1600" b="1" dirty="0">
+              <a:solidFill>
+                <a:srgbClr val="C00000"/>
+              </a:solidFill>
+            </a:endParaRPr>
+          </a:p>
+        </p:txBody>
+      </p:sp>
+      <p:sp>
+        <p:nvSpPr>
+          <p:cNvPr id="70" name="Oval 69">
+            <a:extLst>
+              <a:ext uri="{FF2B5EF4-FFF2-40B4-BE49-F238E27FC236}">
+                <a16:creationId xmlns:a16="http://schemas.microsoft.com/office/drawing/2014/main" id="{FF0CF517-32FE-9E19-0D2B-4BA2978CBE2E}"/>
+              </a:ext>
+            </a:extLst>
+          </p:cNvPr>
+          <p:cNvSpPr/>
+          <p:nvPr/>
+        </p:nvSpPr>
+        <p:spPr>
+          <a:xfrm>
+            <a:off x="5215089" y="2845255"/>
+            <a:ext cx="198642" cy="214127"/>
+          </a:xfrm>
+          <a:prstGeom prst="ellipse">
+            <a:avLst/>
+          </a:prstGeom>
+          <a:solidFill>
+            <a:srgbClr val="FFC000"/>
+          </a:solidFill>
+        </p:spPr>
+        <p:style>
+          <a:lnRef idx="2">
+            <a:schemeClr val="accent1">
+              <a:shade val="15000"/>
+            </a:schemeClr>
+          </a:lnRef>
+          <a:fillRef idx="1">
+            <a:schemeClr val="accent1"/>
+          </a:fillRef>
+          <a:effectRef idx="0">
+            <a:schemeClr val="accent1"/>
+          </a:effectRef>
+          <a:fontRef idx="minor">
+            <a:schemeClr val="lt1"/>
+          </a:fontRef>
+        </p:style>
+        <p:txBody>
+          <a:bodyPr rtlCol="0" anchor="ctr"/>
+          <a:lstStyle/>
+          <a:p>
+            <a:pPr algn="ctr"/>
+            <a:r>
+              <a:rPr lang="en-US" sz="1600" b="1" dirty="0">
+                <a:solidFill>
+                  <a:srgbClr val="C00000"/>
+                </a:solidFill>
+              </a:rPr>
+              <a:t>4</a:t>
+            </a:r>
+            <a:endParaRPr lang="en-SG" sz="1600" b="1" dirty="0">
+              <a:solidFill>
+                <a:srgbClr val="C00000"/>
+              </a:solidFill>
+            </a:endParaRPr>
+          </a:p>
+        </p:txBody>
+      </p:sp>
+      <p:sp>
+        <p:nvSpPr>
+          <p:cNvPr id="71" name="Oval 70">
+            <a:extLst>
+              <a:ext uri="{FF2B5EF4-FFF2-40B4-BE49-F238E27FC236}">
+                <a16:creationId xmlns:a16="http://schemas.microsoft.com/office/drawing/2014/main" id="{E9BA8FA2-8EE1-2AD4-0325-CEC8E9816068}"/>
+              </a:ext>
+            </a:extLst>
+          </p:cNvPr>
+          <p:cNvSpPr/>
+          <p:nvPr/>
+        </p:nvSpPr>
+        <p:spPr>
+          <a:xfrm>
+            <a:off x="5883589" y="3015283"/>
+            <a:ext cx="198642" cy="214127"/>
+          </a:xfrm>
+          <a:prstGeom prst="ellipse">
+            <a:avLst/>
+          </a:prstGeom>
+          <a:solidFill>
+            <a:srgbClr val="FFC000"/>
+          </a:solidFill>
+        </p:spPr>
+        <p:style>
+          <a:lnRef idx="2">
+            <a:schemeClr val="accent1">
+              <a:shade val="15000"/>
+            </a:schemeClr>
+          </a:lnRef>
+          <a:fillRef idx="1">
+            <a:schemeClr val="accent1"/>
+          </a:fillRef>
+          <a:effectRef idx="0">
+            <a:schemeClr val="accent1"/>
+          </a:effectRef>
+          <a:fontRef idx="minor">
+            <a:schemeClr val="lt1"/>
+          </a:fontRef>
+        </p:style>
+        <p:txBody>
+          <a:bodyPr rtlCol="0" anchor="ctr"/>
+          <a:lstStyle/>
+          <a:p>
+            <a:pPr algn="ctr"/>
+            <a:r>
+              <a:rPr lang="en-US" sz="1600" b="1" dirty="0">
+                <a:solidFill>
+                  <a:srgbClr val="C00000"/>
+                </a:solidFill>
+              </a:rPr>
+              <a:t>5</a:t>
+            </a:r>
+            <a:endParaRPr lang="en-SG" sz="1600" b="1" dirty="0">
+              <a:solidFill>
+                <a:srgbClr val="C00000"/>
+              </a:solidFill>
+            </a:endParaRPr>
+          </a:p>
+        </p:txBody>
+      </p:sp>
+      <p:sp>
+        <p:nvSpPr>
+          <p:cNvPr id="72" name="Oval 71">
+            <a:extLst>
+              <a:ext uri="{FF2B5EF4-FFF2-40B4-BE49-F238E27FC236}">
+                <a16:creationId xmlns:a16="http://schemas.microsoft.com/office/drawing/2014/main" id="{F1E7B881-7E00-2D25-F90F-C6A7CC07A5D7}"/>
+              </a:ext>
+            </a:extLst>
+          </p:cNvPr>
+          <p:cNvSpPr/>
+          <p:nvPr/>
+        </p:nvSpPr>
+        <p:spPr>
+          <a:xfrm>
+            <a:off x="2670876" y="2927808"/>
+            <a:ext cx="198642" cy="214127"/>
+          </a:xfrm>
+          <a:prstGeom prst="ellipse">
+            <a:avLst/>
+          </a:prstGeom>
+          <a:solidFill>
+            <a:srgbClr val="FFC000"/>
+          </a:solidFill>
+        </p:spPr>
+        <p:style>
+          <a:lnRef idx="2">
+            <a:schemeClr val="accent1">
+              <a:shade val="15000"/>
+            </a:schemeClr>
+          </a:lnRef>
+          <a:fillRef idx="1">
+            <a:schemeClr val="accent1"/>
+          </a:fillRef>
+          <a:effectRef idx="0">
+            <a:schemeClr val="accent1"/>
+          </a:effectRef>
+          <a:fontRef idx="minor">
+            <a:schemeClr val="lt1"/>
+          </a:fontRef>
+        </p:style>
+        <p:txBody>
+          <a:bodyPr rtlCol="0" anchor="ctr"/>
+          <a:lstStyle/>
+          <a:p>
+            <a:pPr algn="ctr"/>
+            <a:r>
+              <a:rPr lang="en-US" sz="1600" b="1" dirty="0">
+                <a:solidFill>
+                  <a:srgbClr val="C00000"/>
+                </a:solidFill>
+              </a:rPr>
+              <a:t>6</a:t>
+            </a:r>
+            <a:endParaRPr lang="en-SG" sz="1600" b="1" dirty="0">
+              <a:solidFill>
+                <a:srgbClr val="C00000"/>
+              </a:solidFill>
+            </a:endParaRPr>
+          </a:p>
+        </p:txBody>
+      </p:sp>
+    </p:spTree>
+    <p:extLst>
+      <p:ext uri="{BB962C8B-B14F-4D97-AF65-F5344CB8AC3E}">
+        <p14:creationId xmlns:p14="http://schemas.microsoft.com/office/powerpoint/2010/main" val="3478707917"/>
+      </p:ext>
+    </p:extLst>
+  </p:cSld>
+  <p:clrMapOvr>
+    <a:masterClrMapping/>
+  </p:clrMapOvr>
+</p:sld>
+</file>
+
 <file path=ppt/theme/theme1.xml><?xml version="1.0" encoding="utf-8"?>
 <a:theme xmlns:a="http://schemas.openxmlformats.org/drawingml/2006/main" name="Office Theme">
   <a:themeElements>

</xml_diff>

<commit_message>
update the use case document.
</commit_message>
<xml_diff>
--- a/OPCUA_PLC_Simulator/doc/desigDoc.pptx
+++ b/OPCUA_PLC_Simulator/doc/desigDoc.pptx
@@ -11386,6 +11386,888 @@
                 <a:srgbClr val="C00000"/>
               </a:solidFill>
             </a:endParaRPr>
+          </a:p>
+        </p:txBody>
+      </p:sp>
+      <p:sp>
+        <p:nvSpPr>
+          <p:cNvPr id="73" name="Oval 72">
+            <a:extLst>
+              <a:ext uri="{FF2B5EF4-FFF2-40B4-BE49-F238E27FC236}">
+                <a16:creationId xmlns:a16="http://schemas.microsoft.com/office/drawing/2014/main" id="{80076C5C-DB70-B361-168D-9C87F2575662}"/>
+              </a:ext>
+            </a:extLst>
+          </p:cNvPr>
+          <p:cNvSpPr/>
+          <p:nvPr/>
+        </p:nvSpPr>
+        <p:spPr>
+          <a:xfrm>
+            <a:off x="7545606" y="1925524"/>
+            <a:ext cx="198642" cy="214127"/>
+          </a:xfrm>
+          <a:prstGeom prst="ellipse">
+            <a:avLst/>
+          </a:prstGeom>
+          <a:solidFill>
+            <a:srgbClr val="FFC000"/>
+          </a:solidFill>
+        </p:spPr>
+        <p:style>
+          <a:lnRef idx="2">
+            <a:schemeClr val="accent1">
+              <a:shade val="15000"/>
+            </a:schemeClr>
+          </a:lnRef>
+          <a:fillRef idx="1">
+            <a:schemeClr val="accent1"/>
+          </a:fillRef>
+          <a:effectRef idx="0">
+            <a:schemeClr val="accent1"/>
+          </a:effectRef>
+          <a:fontRef idx="minor">
+            <a:schemeClr val="lt1"/>
+          </a:fontRef>
+        </p:style>
+        <p:txBody>
+          <a:bodyPr rtlCol="0" anchor="ctr"/>
+          <a:lstStyle/>
+          <a:p>
+            <a:pPr algn="ctr"/>
+            <a:r>
+              <a:rPr lang="en-US" sz="1600" b="1" dirty="0">
+                <a:solidFill>
+                  <a:srgbClr val="C00000"/>
+                </a:solidFill>
+              </a:rPr>
+              <a:t>7</a:t>
+            </a:r>
+            <a:endParaRPr lang="en-SG" sz="1600" b="1" dirty="0">
+              <a:solidFill>
+                <a:srgbClr val="C00000"/>
+              </a:solidFill>
+            </a:endParaRPr>
+          </a:p>
+        </p:txBody>
+      </p:sp>
+      <p:sp>
+        <p:nvSpPr>
+          <p:cNvPr id="74" name="Oval 73">
+            <a:extLst>
+              <a:ext uri="{FF2B5EF4-FFF2-40B4-BE49-F238E27FC236}">
+                <a16:creationId xmlns:a16="http://schemas.microsoft.com/office/drawing/2014/main" id="{293B6311-92B1-77DA-6852-C4C146C4A6DB}"/>
+              </a:ext>
+            </a:extLst>
+          </p:cNvPr>
+          <p:cNvSpPr/>
+          <p:nvPr/>
+        </p:nvSpPr>
+        <p:spPr>
+          <a:xfrm>
+            <a:off x="7604047" y="2490636"/>
+            <a:ext cx="198642" cy="214127"/>
+          </a:xfrm>
+          <a:prstGeom prst="ellipse">
+            <a:avLst/>
+          </a:prstGeom>
+          <a:solidFill>
+            <a:srgbClr val="FFC000"/>
+          </a:solidFill>
+        </p:spPr>
+        <p:style>
+          <a:lnRef idx="2">
+            <a:schemeClr val="accent1">
+              <a:shade val="15000"/>
+            </a:schemeClr>
+          </a:lnRef>
+          <a:fillRef idx="1">
+            <a:schemeClr val="accent1"/>
+          </a:fillRef>
+          <a:effectRef idx="0">
+            <a:schemeClr val="accent1"/>
+          </a:effectRef>
+          <a:fontRef idx="minor">
+            <a:schemeClr val="lt1"/>
+          </a:fontRef>
+        </p:style>
+        <p:txBody>
+          <a:bodyPr rtlCol="0" anchor="ctr"/>
+          <a:lstStyle/>
+          <a:p>
+            <a:pPr algn="ctr"/>
+            <a:r>
+              <a:rPr lang="en-US" sz="1600" b="1" dirty="0">
+                <a:solidFill>
+                  <a:srgbClr val="C00000"/>
+                </a:solidFill>
+              </a:rPr>
+              <a:t>7</a:t>
+            </a:r>
+            <a:endParaRPr lang="en-SG" sz="1600" b="1" dirty="0">
+              <a:solidFill>
+                <a:srgbClr val="C00000"/>
+              </a:solidFill>
+            </a:endParaRPr>
+          </a:p>
+        </p:txBody>
+      </p:sp>
+      <p:sp>
+        <p:nvSpPr>
+          <p:cNvPr id="75" name="Oval 74">
+            <a:extLst>
+              <a:ext uri="{FF2B5EF4-FFF2-40B4-BE49-F238E27FC236}">
+                <a16:creationId xmlns:a16="http://schemas.microsoft.com/office/drawing/2014/main" id="{5A6E2366-83BF-B808-57E4-8DE7B850F923}"/>
+              </a:ext>
+            </a:extLst>
+          </p:cNvPr>
+          <p:cNvSpPr/>
+          <p:nvPr/>
+        </p:nvSpPr>
+        <p:spPr>
+          <a:xfrm>
+            <a:off x="10301472" y="1840986"/>
+            <a:ext cx="198642" cy="214127"/>
+          </a:xfrm>
+          <a:prstGeom prst="ellipse">
+            <a:avLst/>
+          </a:prstGeom>
+          <a:solidFill>
+            <a:srgbClr val="FFC000"/>
+          </a:solidFill>
+        </p:spPr>
+        <p:style>
+          <a:lnRef idx="2">
+            <a:schemeClr val="accent1">
+              <a:shade val="15000"/>
+            </a:schemeClr>
+          </a:lnRef>
+          <a:fillRef idx="1">
+            <a:schemeClr val="accent1"/>
+          </a:fillRef>
+          <a:effectRef idx="0">
+            <a:schemeClr val="accent1"/>
+          </a:effectRef>
+          <a:fontRef idx="minor">
+            <a:schemeClr val="lt1"/>
+          </a:fontRef>
+        </p:style>
+        <p:txBody>
+          <a:bodyPr rtlCol="0" anchor="ctr"/>
+          <a:lstStyle/>
+          <a:p>
+            <a:pPr algn="ctr"/>
+            <a:r>
+              <a:rPr lang="en-US" sz="1600" b="1" dirty="0">
+                <a:solidFill>
+                  <a:srgbClr val="C00000"/>
+                </a:solidFill>
+              </a:rPr>
+              <a:t>8</a:t>
+            </a:r>
+            <a:endParaRPr lang="en-SG" sz="1600" b="1" dirty="0">
+              <a:solidFill>
+                <a:srgbClr val="C00000"/>
+              </a:solidFill>
+            </a:endParaRPr>
+          </a:p>
+        </p:txBody>
+      </p:sp>
+      <p:sp>
+        <p:nvSpPr>
+          <p:cNvPr id="76" name="Oval 75">
+            <a:extLst>
+              <a:ext uri="{FF2B5EF4-FFF2-40B4-BE49-F238E27FC236}">
+                <a16:creationId xmlns:a16="http://schemas.microsoft.com/office/drawing/2014/main" id="{40AE996A-B757-165F-D076-0CD30A882DF6}"/>
+              </a:ext>
+            </a:extLst>
+          </p:cNvPr>
+          <p:cNvSpPr/>
+          <p:nvPr/>
+        </p:nvSpPr>
+        <p:spPr>
+          <a:xfrm>
+            <a:off x="10315907" y="2623191"/>
+            <a:ext cx="198642" cy="214127"/>
+          </a:xfrm>
+          <a:prstGeom prst="ellipse">
+            <a:avLst/>
+          </a:prstGeom>
+          <a:solidFill>
+            <a:srgbClr val="FFC000"/>
+          </a:solidFill>
+        </p:spPr>
+        <p:style>
+          <a:lnRef idx="2">
+            <a:schemeClr val="accent1">
+              <a:shade val="15000"/>
+            </a:schemeClr>
+          </a:lnRef>
+          <a:fillRef idx="1">
+            <a:schemeClr val="accent1"/>
+          </a:fillRef>
+          <a:effectRef idx="0">
+            <a:schemeClr val="accent1"/>
+          </a:effectRef>
+          <a:fontRef idx="minor">
+            <a:schemeClr val="lt1"/>
+          </a:fontRef>
+        </p:style>
+        <p:txBody>
+          <a:bodyPr rtlCol="0" anchor="ctr"/>
+          <a:lstStyle/>
+          <a:p>
+            <a:pPr algn="ctr"/>
+            <a:r>
+              <a:rPr lang="en-US" sz="1600" b="1" dirty="0">
+                <a:solidFill>
+                  <a:srgbClr val="C00000"/>
+                </a:solidFill>
+              </a:rPr>
+              <a:t>9</a:t>
+            </a:r>
+            <a:endParaRPr lang="en-SG" sz="1600" b="1" dirty="0">
+              <a:solidFill>
+                <a:srgbClr val="C00000"/>
+              </a:solidFill>
+            </a:endParaRPr>
+          </a:p>
+        </p:txBody>
+      </p:sp>
+      <p:cxnSp>
+        <p:nvCxnSpPr>
+          <p:cNvPr id="79" name="Straight Connector 78">
+            <a:extLst>
+              <a:ext uri="{FF2B5EF4-FFF2-40B4-BE49-F238E27FC236}">
+                <a16:creationId xmlns:a16="http://schemas.microsoft.com/office/drawing/2014/main" id="{FC6BE31C-745F-3170-4635-392C365FA6E8}"/>
+              </a:ext>
+            </a:extLst>
+          </p:cNvPr>
+          <p:cNvCxnSpPr>
+            <a:cxnSpLocks/>
+          </p:cNvCxnSpPr>
+          <p:nvPr/>
+        </p:nvCxnSpPr>
+        <p:spPr>
+          <a:xfrm>
+            <a:off x="2067809" y="5214952"/>
+            <a:ext cx="1405149" cy="0"/>
+          </a:xfrm>
+          <a:prstGeom prst="line">
+            <a:avLst/>
+          </a:prstGeom>
+        </p:spPr>
+        <p:style>
+          <a:lnRef idx="2">
+            <a:schemeClr val="dk1"/>
+          </a:lnRef>
+          <a:fillRef idx="0">
+            <a:schemeClr val="dk1"/>
+          </a:fillRef>
+          <a:effectRef idx="1">
+            <a:schemeClr val="dk1"/>
+          </a:effectRef>
+          <a:fontRef idx="minor">
+            <a:schemeClr val="tx1"/>
+          </a:fontRef>
+        </p:style>
+      </p:cxnSp>
+      <p:pic>
+        <p:nvPicPr>
+          <p:cNvPr id="80" name="Picture 79">
+            <a:extLst>
+              <a:ext uri="{FF2B5EF4-FFF2-40B4-BE49-F238E27FC236}">
+                <a16:creationId xmlns:a16="http://schemas.microsoft.com/office/drawing/2014/main" id="{48A40D56-6D66-4307-BA80-4C471F991315}"/>
+              </a:ext>
+            </a:extLst>
+          </p:cNvPr>
+          <p:cNvPicPr>
+            <a:picLocks noChangeAspect="1"/>
+          </p:cNvPicPr>
+          <p:nvPr/>
+        </p:nvPicPr>
+        <p:blipFill>
+          <a:blip r:embed="rId2">
+            <a:extLst>
+              <a:ext uri="{28A0092B-C50C-407E-A947-70E740481C1C}">
+                <a14:useLocalDpi xmlns:a14="http://schemas.microsoft.com/office/drawing/2010/main" val="0"/>
+              </a:ext>
+            </a:extLst>
+          </a:blip>
+          <a:stretch>
+            <a:fillRect/>
+          </a:stretch>
+        </p:blipFill>
+        <p:spPr>
+          <a:xfrm>
+            <a:off x="1577225" y="4376735"/>
+            <a:ext cx="506017" cy="400107"/>
+          </a:xfrm>
+          <a:prstGeom prst="rect">
+            <a:avLst/>
+          </a:prstGeom>
+        </p:spPr>
+      </p:pic>
+      <p:cxnSp>
+        <p:nvCxnSpPr>
+          <p:cNvPr id="81" name="Straight Connector 80">
+            <a:extLst>
+              <a:ext uri="{FF2B5EF4-FFF2-40B4-BE49-F238E27FC236}">
+                <a16:creationId xmlns:a16="http://schemas.microsoft.com/office/drawing/2014/main" id="{95AC806E-0666-FC6E-C133-41C54AA53FBB}"/>
+              </a:ext>
+            </a:extLst>
+          </p:cNvPr>
+          <p:cNvCxnSpPr>
+            <a:cxnSpLocks/>
+          </p:cNvCxnSpPr>
+          <p:nvPr/>
+        </p:nvCxnSpPr>
+        <p:spPr>
+          <a:xfrm>
+            <a:off x="2084495" y="4567263"/>
+            <a:ext cx="1373896" cy="0"/>
+          </a:xfrm>
+          <a:prstGeom prst="line">
+            <a:avLst/>
+          </a:prstGeom>
+        </p:spPr>
+        <p:style>
+          <a:lnRef idx="2">
+            <a:schemeClr val="dk1"/>
+          </a:lnRef>
+          <a:fillRef idx="0">
+            <a:schemeClr val="dk1"/>
+          </a:fillRef>
+          <a:effectRef idx="1">
+            <a:schemeClr val="dk1"/>
+          </a:effectRef>
+          <a:fontRef idx="minor">
+            <a:schemeClr val="tx1"/>
+          </a:fontRef>
+        </p:style>
+      </p:cxnSp>
+      <p:pic>
+        <p:nvPicPr>
+          <p:cNvPr id="82" name="Picture 81">
+            <a:extLst>
+              <a:ext uri="{FF2B5EF4-FFF2-40B4-BE49-F238E27FC236}">
+                <a16:creationId xmlns:a16="http://schemas.microsoft.com/office/drawing/2014/main" id="{FC0B319F-9DBC-90AC-5ADE-5C2F4CAE1055}"/>
+              </a:ext>
+            </a:extLst>
+          </p:cNvPr>
+          <p:cNvPicPr>
+            <a:picLocks noChangeAspect="1"/>
+          </p:cNvPicPr>
+          <p:nvPr/>
+        </p:nvPicPr>
+        <p:blipFill>
+          <a:blip r:embed="rId2">
+            <a:extLst>
+              <a:ext uri="{28A0092B-C50C-407E-A947-70E740481C1C}">
+                <a14:useLocalDpi xmlns:a14="http://schemas.microsoft.com/office/drawing/2010/main" val="0"/>
+              </a:ext>
+            </a:extLst>
+          </a:blip>
+          <a:stretch>
+            <a:fillRect/>
+          </a:stretch>
+        </p:blipFill>
+        <p:spPr>
+          <a:xfrm>
+            <a:off x="1577225" y="5020130"/>
+            <a:ext cx="506017" cy="400107"/>
+          </a:xfrm>
+          <a:prstGeom prst="rect">
+            <a:avLst/>
+          </a:prstGeom>
+        </p:spPr>
+      </p:pic>
+      <p:sp>
+        <p:nvSpPr>
+          <p:cNvPr id="85" name="Rectangle 84">
+            <a:extLst>
+              <a:ext uri="{FF2B5EF4-FFF2-40B4-BE49-F238E27FC236}">
+                <a16:creationId xmlns:a16="http://schemas.microsoft.com/office/drawing/2014/main" id="{5616ABDE-72F0-00B9-2BEA-C71C1C383599}"/>
+              </a:ext>
+            </a:extLst>
+          </p:cNvPr>
+          <p:cNvSpPr/>
+          <p:nvPr/>
+        </p:nvSpPr>
+        <p:spPr>
+          <a:xfrm>
+            <a:off x="3458391" y="4410446"/>
+            <a:ext cx="1373896" cy="972291"/>
+          </a:xfrm>
+          <a:prstGeom prst="rect">
+            <a:avLst/>
+          </a:prstGeom>
+          <a:solidFill>
+            <a:schemeClr val="bg1"/>
+          </a:solidFill>
+          <a:ln>
+            <a:solidFill>
+              <a:schemeClr val="tx1"/>
+            </a:solidFill>
+          </a:ln>
+        </p:spPr>
+        <p:style>
+          <a:lnRef idx="2">
+            <a:schemeClr val="accent1">
+              <a:shade val="50000"/>
+            </a:schemeClr>
+          </a:lnRef>
+          <a:fillRef idx="1">
+            <a:schemeClr val="accent1"/>
+          </a:fillRef>
+          <a:effectRef idx="0">
+            <a:schemeClr val="accent1"/>
+          </a:effectRef>
+          <a:fontRef idx="minor">
+            <a:schemeClr val="lt1"/>
+          </a:fontRef>
+        </p:style>
+        <p:txBody>
+          <a:bodyPr rtlCol="0" anchor="ctr"/>
+          <a:lstStyle/>
+          <a:p>
+            <a:r>
+              <a:rPr lang="en-US" sz="1050" b="1" dirty="0">
+                <a:solidFill>
+                  <a:schemeClr val="tx1"/>
+                </a:solidFill>
+              </a:rPr>
+              <a:t>IF Temp1 &gt; Temp2 :</a:t>
+            </a:r>
+          </a:p>
+          <a:p>
+            <a:r>
+              <a:rPr lang="en-US" sz="1050" b="1" dirty="0">
+                <a:solidFill>
+                  <a:schemeClr val="tx1"/>
+                </a:solidFill>
+              </a:rPr>
+              <a:t>  OUT = True</a:t>
+            </a:r>
+          </a:p>
+          <a:p>
+            <a:r>
+              <a:rPr lang="en-US" sz="1050" b="1" dirty="0">
+                <a:solidFill>
+                  <a:schemeClr val="tx1"/>
+                </a:solidFill>
+              </a:rPr>
+              <a:t>ELSE</a:t>
+            </a:r>
+          </a:p>
+          <a:p>
+            <a:r>
+              <a:rPr lang="en-US" sz="1050" b="1" dirty="0">
+                <a:solidFill>
+                  <a:schemeClr val="tx1"/>
+                </a:solidFill>
+              </a:rPr>
+              <a:t>  OUT = False</a:t>
+            </a:r>
+          </a:p>
+          <a:p>
+            <a:r>
+              <a:rPr lang="en-US" sz="1050" b="1" dirty="0">
+                <a:solidFill>
+                  <a:schemeClr val="tx1"/>
+                </a:solidFill>
+              </a:rPr>
+              <a:t>END IF </a:t>
+            </a:r>
+          </a:p>
+        </p:txBody>
+      </p:sp>
+      <p:sp>
+        <p:nvSpPr>
+          <p:cNvPr id="87" name="Rectangle 86">
+            <a:extLst>
+              <a:ext uri="{FF2B5EF4-FFF2-40B4-BE49-F238E27FC236}">
+                <a16:creationId xmlns:a16="http://schemas.microsoft.com/office/drawing/2014/main" id="{D2E29714-AB56-55C3-3FB8-82623C434158}"/>
+              </a:ext>
+            </a:extLst>
+          </p:cNvPr>
+          <p:cNvSpPr/>
+          <p:nvPr/>
+        </p:nvSpPr>
+        <p:spPr>
+          <a:xfrm>
+            <a:off x="6230151" y="4410446"/>
+            <a:ext cx="1373896" cy="332505"/>
+          </a:xfrm>
+          <a:prstGeom prst="rect">
+            <a:avLst/>
+          </a:prstGeom>
+          <a:solidFill>
+            <a:schemeClr val="bg1"/>
+          </a:solidFill>
+          <a:ln>
+            <a:solidFill>
+              <a:schemeClr val="tx1"/>
+            </a:solidFill>
+          </a:ln>
+        </p:spPr>
+        <p:style>
+          <a:lnRef idx="2">
+            <a:schemeClr val="accent1">
+              <a:shade val="50000"/>
+            </a:schemeClr>
+          </a:lnRef>
+          <a:fillRef idx="1">
+            <a:schemeClr val="accent1"/>
+          </a:fillRef>
+          <a:effectRef idx="0">
+            <a:schemeClr val="accent1"/>
+          </a:effectRef>
+          <a:fontRef idx="minor">
+            <a:schemeClr val="lt1"/>
+          </a:fontRef>
+        </p:style>
+        <p:txBody>
+          <a:bodyPr rtlCol="0" anchor="ctr"/>
+          <a:lstStyle/>
+          <a:p>
+            <a:r>
+              <a:rPr lang="en-US" sz="1050" b="1" dirty="0" err="1">
+                <a:solidFill>
+                  <a:schemeClr val="tx1"/>
+                </a:solidFill>
+              </a:rPr>
+              <a:t>compare_bool_var</a:t>
+            </a:r>
+            <a:endParaRPr lang="en-US" sz="1050" b="1" dirty="0">
+              <a:solidFill>
+                <a:schemeClr val="tx1"/>
+              </a:solidFill>
+            </a:endParaRPr>
+          </a:p>
+        </p:txBody>
+      </p:sp>
+      <p:sp>
+        <p:nvSpPr>
+          <p:cNvPr id="88" name="TextBox 87">
+            <a:extLst>
+              <a:ext uri="{FF2B5EF4-FFF2-40B4-BE49-F238E27FC236}">
+                <a16:creationId xmlns:a16="http://schemas.microsoft.com/office/drawing/2014/main" id="{A339CD68-061E-D41E-3D45-5F5A08BA6558}"/>
+              </a:ext>
+            </a:extLst>
+          </p:cNvPr>
+          <p:cNvSpPr txBox="1"/>
+          <p:nvPr/>
+        </p:nvSpPr>
+        <p:spPr>
+          <a:xfrm>
+            <a:off x="1430837" y="4142188"/>
+            <a:ext cx="1304809" cy="253916"/>
+          </a:xfrm>
+          <a:prstGeom prst="rect">
+            <a:avLst/>
+          </a:prstGeom>
+          <a:noFill/>
+        </p:spPr>
+        <p:txBody>
+          <a:bodyPr wrap="square" rtlCol="0">
+            <a:spAutoFit/>
+          </a:bodyPr>
+          <a:lstStyle/>
+          <a:p>
+            <a:r>
+              <a:rPr lang="en-SG" sz="1050" b="1" dirty="0"/>
+              <a:t>Temperature_var1</a:t>
+            </a:r>
+          </a:p>
+        </p:txBody>
+      </p:sp>
+      <p:cxnSp>
+        <p:nvCxnSpPr>
+          <p:cNvPr id="96" name="Straight Connector 95">
+            <a:extLst>
+              <a:ext uri="{FF2B5EF4-FFF2-40B4-BE49-F238E27FC236}">
+                <a16:creationId xmlns:a16="http://schemas.microsoft.com/office/drawing/2014/main" id="{243B3C17-66BA-11C5-5C17-3369DDB2E20E}"/>
+              </a:ext>
+            </a:extLst>
+          </p:cNvPr>
+          <p:cNvCxnSpPr>
+            <a:cxnSpLocks/>
+          </p:cNvCxnSpPr>
+          <p:nvPr/>
+        </p:nvCxnSpPr>
+        <p:spPr>
+          <a:xfrm>
+            <a:off x="4844271" y="4576788"/>
+            <a:ext cx="1373896" cy="0"/>
+          </a:xfrm>
+          <a:prstGeom prst="line">
+            <a:avLst/>
+          </a:prstGeom>
+        </p:spPr>
+        <p:style>
+          <a:lnRef idx="2">
+            <a:schemeClr val="dk1"/>
+          </a:lnRef>
+          <a:fillRef idx="0">
+            <a:schemeClr val="dk1"/>
+          </a:fillRef>
+          <a:effectRef idx="1">
+            <a:schemeClr val="dk1"/>
+          </a:effectRef>
+          <a:fontRef idx="minor">
+            <a:schemeClr val="tx1"/>
+          </a:fontRef>
+        </p:style>
+      </p:cxnSp>
+      <p:cxnSp>
+        <p:nvCxnSpPr>
+          <p:cNvPr id="97" name="Straight Connector 96">
+            <a:extLst>
+              <a:ext uri="{FF2B5EF4-FFF2-40B4-BE49-F238E27FC236}">
+                <a16:creationId xmlns:a16="http://schemas.microsoft.com/office/drawing/2014/main" id="{1BBC243E-1ADF-FDE4-EEAD-FE865EA4952A}"/>
+              </a:ext>
+            </a:extLst>
+          </p:cNvPr>
+          <p:cNvCxnSpPr>
+            <a:cxnSpLocks/>
+          </p:cNvCxnSpPr>
+          <p:nvPr/>
+        </p:nvCxnSpPr>
+        <p:spPr>
+          <a:xfrm>
+            <a:off x="3223134" y="4567644"/>
+            <a:ext cx="0" cy="918756"/>
+          </a:xfrm>
+          <a:prstGeom prst="line">
+            <a:avLst/>
+          </a:prstGeom>
+        </p:spPr>
+        <p:style>
+          <a:lnRef idx="2">
+            <a:schemeClr val="dk1"/>
+          </a:lnRef>
+          <a:fillRef idx="0">
+            <a:schemeClr val="dk1"/>
+          </a:fillRef>
+          <a:effectRef idx="1">
+            <a:schemeClr val="dk1"/>
+          </a:effectRef>
+          <a:fontRef idx="minor">
+            <a:schemeClr val="tx1"/>
+          </a:fontRef>
+        </p:style>
+      </p:cxnSp>
+      <p:cxnSp>
+        <p:nvCxnSpPr>
+          <p:cNvPr id="100" name="Straight Connector 99">
+            <a:extLst>
+              <a:ext uri="{FF2B5EF4-FFF2-40B4-BE49-F238E27FC236}">
+                <a16:creationId xmlns:a16="http://schemas.microsoft.com/office/drawing/2014/main" id="{4F2E716F-FA0B-07B3-7803-69C224692576}"/>
+              </a:ext>
+            </a:extLst>
+          </p:cNvPr>
+          <p:cNvCxnSpPr>
+            <a:cxnSpLocks/>
+          </p:cNvCxnSpPr>
+          <p:nvPr/>
+        </p:nvCxnSpPr>
+        <p:spPr>
+          <a:xfrm>
+            <a:off x="2970600" y="5204372"/>
+            <a:ext cx="0" cy="405324"/>
+          </a:xfrm>
+          <a:prstGeom prst="line">
+            <a:avLst/>
+          </a:prstGeom>
+        </p:spPr>
+        <p:style>
+          <a:lnRef idx="2">
+            <a:schemeClr val="dk1"/>
+          </a:lnRef>
+          <a:fillRef idx="0">
+            <a:schemeClr val="dk1"/>
+          </a:fillRef>
+          <a:effectRef idx="1">
+            <a:schemeClr val="dk1"/>
+          </a:effectRef>
+          <a:fontRef idx="minor">
+            <a:schemeClr val="tx1"/>
+          </a:fontRef>
+        </p:style>
+      </p:cxnSp>
+      <p:cxnSp>
+        <p:nvCxnSpPr>
+          <p:cNvPr id="103" name="Straight Connector 102">
+            <a:extLst>
+              <a:ext uri="{FF2B5EF4-FFF2-40B4-BE49-F238E27FC236}">
+                <a16:creationId xmlns:a16="http://schemas.microsoft.com/office/drawing/2014/main" id="{9276C1CC-2E57-4244-E0F9-A8ABC4FA56B2}"/>
+              </a:ext>
+            </a:extLst>
+          </p:cNvPr>
+          <p:cNvCxnSpPr>
+            <a:cxnSpLocks/>
+          </p:cNvCxnSpPr>
+          <p:nvPr/>
+        </p:nvCxnSpPr>
+        <p:spPr>
+          <a:xfrm flipV="1">
+            <a:off x="3213990" y="5486400"/>
+            <a:ext cx="3004177" cy="0"/>
+          </a:xfrm>
+          <a:prstGeom prst="line">
+            <a:avLst/>
+          </a:prstGeom>
+        </p:spPr>
+        <p:style>
+          <a:lnRef idx="2">
+            <a:schemeClr val="dk1"/>
+          </a:lnRef>
+          <a:fillRef idx="0">
+            <a:schemeClr val="dk1"/>
+          </a:fillRef>
+          <a:effectRef idx="1">
+            <a:schemeClr val="dk1"/>
+          </a:effectRef>
+          <a:fontRef idx="minor">
+            <a:schemeClr val="tx1"/>
+          </a:fontRef>
+        </p:style>
+      </p:cxnSp>
+      <p:cxnSp>
+        <p:nvCxnSpPr>
+          <p:cNvPr id="106" name="Straight Connector 105">
+            <a:extLst>
+              <a:ext uri="{FF2B5EF4-FFF2-40B4-BE49-F238E27FC236}">
+                <a16:creationId xmlns:a16="http://schemas.microsoft.com/office/drawing/2014/main" id="{61349FDC-B6C6-7FF0-AE63-3F645444A948}"/>
+              </a:ext>
+            </a:extLst>
+          </p:cNvPr>
+          <p:cNvCxnSpPr>
+            <a:cxnSpLocks/>
+          </p:cNvCxnSpPr>
+          <p:nvPr/>
+        </p:nvCxnSpPr>
+        <p:spPr>
+          <a:xfrm>
+            <a:off x="2961756" y="5609696"/>
+            <a:ext cx="3256411" cy="10833"/>
+          </a:xfrm>
+          <a:prstGeom prst="line">
+            <a:avLst/>
+          </a:prstGeom>
+        </p:spPr>
+        <p:style>
+          <a:lnRef idx="2">
+            <a:schemeClr val="dk1"/>
+          </a:lnRef>
+          <a:fillRef idx="0">
+            <a:schemeClr val="dk1"/>
+          </a:fillRef>
+          <a:effectRef idx="1">
+            <a:schemeClr val="dk1"/>
+          </a:effectRef>
+          <a:fontRef idx="minor">
+            <a:schemeClr val="tx1"/>
+          </a:fontRef>
+        </p:style>
+      </p:cxnSp>
+      <p:sp>
+        <p:nvSpPr>
+          <p:cNvPr id="111" name="Rectangle 110">
+            <a:extLst>
+              <a:ext uri="{FF2B5EF4-FFF2-40B4-BE49-F238E27FC236}">
+                <a16:creationId xmlns:a16="http://schemas.microsoft.com/office/drawing/2014/main" id="{C3AAA9EB-B1A7-B4B4-31B4-A61D1B357A0D}"/>
+              </a:ext>
+            </a:extLst>
+          </p:cNvPr>
+          <p:cNvSpPr/>
+          <p:nvPr/>
+        </p:nvSpPr>
+        <p:spPr>
+          <a:xfrm>
+            <a:off x="6230151" y="5396288"/>
+            <a:ext cx="1373896" cy="332505"/>
+          </a:xfrm>
+          <a:prstGeom prst="rect">
+            <a:avLst/>
+          </a:prstGeom>
+          <a:solidFill>
+            <a:schemeClr val="bg1"/>
+          </a:solidFill>
+          <a:ln>
+            <a:solidFill>
+              <a:schemeClr val="tx1"/>
+            </a:solidFill>
+          </a:ln>
+        </p:spPr>
+        <p:style>
+          <a:lnRef idx="2">
+            <a:schemeClr val="accent1">
+              <a:shade val="50000"/>
+            </a:schemeClr>
+          </a:lnRef>
+          <a:fillRef idx="1">
+            <a:schemeClr val="accent1"/>
+          </a:fillRef>
+          <a:effectRef idx="0">
+            <a:schemeClr val="accent1"/>
+          </a:effectRef>
+          <a:fontRef idx="minor">
+            <a:schemeClr val="lt1"/>
+          </a:fontRef>
+        </p:style>
+        <p:txBody>
+          <a:bodyPr rtlCol="0" anchor="ctr"/>
+          <a:lstStyle/>
+          <a:p>
+            <a:r>
+              <a:rPr lang="en-US" sz="1050" b="1" dirty="0" err="1">
+                <a:solidFill>
+                  <a:schemeClr val="tx1"/>
+                </a:solidFill>
+              </a:rPr>
+              <a:t>combine_message</a:t>
+            </a:r>
+            <a:endParaRPr lang="en-US" sz="1050" b="1" dirty="0">
+              <a:solidFill>
+                <a:schemeClr val="tx1"/>
+              </a:solidFill>
+            </a:endParaRPr>
+          </a:p>
+        </p:txBody>
+      </p:sp>
+      <p:sp>
+        <p:nvSpPr>
+          <p:cNvPr id="112" name="TextBox 111">
+            <a:extLst>
+              <a:ext uri="{FF2B5EF4-FFF2-40B4-BE49-F238E27FC236}">
+                <a16:creationId xmlns:a16="http://schemas.microsoft.com/office/drawing/2014/main" id="{81E2B849-F6AB-2DFD-B0B5-7978C159D8A0}"/>
+              </a:ext>
+            </a:extLst>
+          </p:cNvPr>
+          <p:cNvSpPr txBox="1"/>
+          <p:nvPr/>
+        </p:nvSpPr>
+        <p:spPr>
+          <a:xfrm>
+            <a:off x="1430836" y="4834214"/>
+            <a:ext cx="1304809" cy="253916"/>
+          </a:xfrm>
+          <a:prstGeom prst="rect">
+            <a:avLst/>
+          </a:prstGeom>
+          <a:noFill/>
+        </p:spPr>
+        <p:txBody>
+          <a:bodyPr wrap="square" rtlCol="0">
+            <a:spAutoFit/>
+          </a:bodyPr>
+          <a:lstStyle/>
+          <a:p>
+            <a:r>
+              <a:rPr lang="en-SG" sz="1050" b="1" dirty="0"/>
+              <a:t>Temperature_var2</a:t>
+            </a:r>
           </a:p>
         </p:txBody>
       </p:sp>

</xml_diff>

<commit_message>
Added the reference link.
</commit_message>
<xml_diff>
--- a/OPCUA_PLC_Simulator/doc/desigDoc.pptx
+++ b/OPCUA_PLC_Simulator/doc/desigDoc.pptx
@@ -263,7 +263,7 @@
           <a:p>
             <a:fld id="{5D72A3BA-B397-446C-B373-EC30C6B5623D}" type="datetimeFigureOut">
               <a:rPr lang="en-SG" smtClean="0"/>
-              <a:t>10/12/2025</a:t>
+              <a:t>11/12/2025</a:t>
             </a:fld>
             <a:endParaRPr lang="en-SG"/>
           </a:p>
@@ -463,7 +463,7 @@
           <a:p>
             <a:fld id="{5D72A3BA-B397-446C-B373-EC30C6B5623D}" type="datetimeFigureOut">
               <a:rPr lang="en-SG" smtClean="0"/>
-              <a:t>10/12/2025</a:t>
+              <a:t>11/12/2025</a:t>
             </a:fld>
             <a:endParaRPr lang="en-SG"/>
           </a:p>
@@ -673,7 +673,7 @@
           <a:p>
             <a:fld id="{5D72A3BA-B397-446C-B373-EC30C6B5623D}" type="datetimeFigureOut">
               <a:rPr lang="en-SG" smtClean="0"/>
-              <a:t>10/12/2025</a:t>
+              <a:t>11/12/2025</a:t>
             </a:fld>
             <a:endParaRPr lang="en-SG"/>
           </a:p>
@@ -873,7 +873,7 @@
           <a:p>
             <a:fld id="{5D72A3BA-B397-446C-B373-EC30C6B5623D}" type="datetimeFigureOut">
               <a:rPr lang="en-SG" smtClean="0"/>
-              <a:t>10/12/2025</a:t>
+              <a:t>11/12/2025</a:t>
             </a:fld>
             <a:endParaRPr lang="en-SG"/>
           </a:p>
@@ -1149,7 +1149,7 @@
           <a:p>
             <a:fld id="{5D72A3BA-B397-446C-B373-EC30C6B5623D}" type="datetimeFigureOut">
               <a:rPr lang="en-SG" smtClean="0"/>
-              <a:t>10/12/2025</a:t>
+              <a:t>11/12/2025</a:t>
             </a:fld>
             <a:endParaRPr lang="en-SG"/>
           </a:p>
@@ -1417,7 +1417,7 @@
           <a:p>
             <a:fld id="{5D72A3BA-B397-446C-B373-EC30C6B5623D}" type="datetimeFigureOut">
               <a:rPr lang="en-SG" smtClean="0"/>
-              <a:t>10/12/2025</a:t>
+              <a:t>11/12/2025</a:t>
             </a:fld>
             <a:endParaRPr lang="en-SG"/>
           </a:p>
@@ -1832,7 +1832,7 @@
           <a:p>
             <a:fld id="{5D72A3BA-B397-446C-B373-EC30C6B5623D}" type="datetimeFigureOut">
               <a:rPr lang="en-SG" smtClean="0"/>
-              <a:t>10/12/2025</a:t>
+              <a:t>11/12/2025</a:t>
             </a:fld>
             <a:endParaRPr lang="en-SG"/>
           </a:p>
@@ -1974,7 +1974,7 @@
           <a:p>
             <a:fld id="{5D72A3BA-B397-446C-B373-EC30C6B5623D}" type="datetimeFigureOut">
               <a:rPr lang="en-SG" smtClean="0"/>
-              <a:t>10/12/2025</a:t>
+              <a:t>11/12/2025</a:t>
             </a:fld>
             <a:endParaRPr lang="en-SG"/>
           </a:p>
@@ -2087,7 +2087,7 @@
           <a:p>
             <a:fld id="{5D72A3BA-B397-446C-B373-EC30C6B5623D}" type="datetimeFigureOut">
               <a:rPr lang="en-SG" smtClean="0"/>
-              <a:t>10/12/2025</a:t>
+              <a:t>11/12/2025</a:t>
             </a:fld>
             <a:endParaRPr lang="en-SG"/>
           </a:p>
@@ -2400,7 +2400,7 @@
           <a:p>
             <a:fld id="{5D72A3BA-B397-446C-B373-EC30C6B5623D}" type="datetimeFigureOut">
               <a:rPr lang="en-SG" smtClean="0"/>
-              <a:t>10/12/2025</a:t>
+              <a:t>11/12/2025</a:t>
             </a:fld>
             <a:endParaRPr lang="en-SG"/>
           </a:p>
@@ -2689,7 +2689,7 @@
           <a:p>
             <a:fld id="{5D72A3BA-B397-446C-B373-EC30C6B5623D}" type="datetimeFigureOut">
               <a:rPr lang="en-SG" smtClean="0"/>
-              <a:t>10/12/2025</a:t>
+              <a:t>11/12/2025</a:t>
             </a:fld>
             <a:endParaRPr lang="en-SG"/>
           </a:p>
@@ -2932,7 +2932,7 @@
           <a:p>
             <a:fld id="{5D72A3BA-B397-446C-B373-EC30C6B5623D}" type="datetimeFigureOut">
               <a:rPr lang="en-SG" smtClean="0"/>
-              <a:t>10/12/2025</a:t>
+              <a:t>11/12/2025</a:t>
             </a:fld>
             <a:endParaRPr lang="en-SG"/>
           </a:p>
@@ -4571,7 +4571,7 @@
         </p:nvSpPr>
         <p:spPr>
           <a:xfrm>
-            <a:off x="8720517" y="1183714"/>
+            <a:off x="8689344" y="1609745"/>
             <a:ext cx="3211175" cy="3103635"/>
           </a:xfrm>
           <a:prstGeom prst="rect">
@@ -4623,8 +4623,8 @@
         </p:nvSpPr>
         <p:spPr>
           <a:xfrm>
-            <a:off x="4553469" y="1152954"/>
-            <a:ext cx="3579817" cy="4667379"/>
+            <a:off x="4522296" y="1578985"/>
+            <a:ext cx="3579817" cy="4762071"/>
           </a:xfrm>
           <a:prstGeom prst="rect">
             <a:avLst/>
@@ -4677,7 +4677,7 @@
         </p:nvCxnSpPr>
         <p:spPr>
           <a:xfrm>
-            <a:off x="4240637" y="905583"/>
+            <a:off x="4209464" y="1331614"/>
             <a:ext cx="0" cy="5114217"/>
           </a:xfrm>
           <a:prstGeom prst="line">
@@ -4721,8 +4721,8 @@
         </p:nvSpPr>
         <p:spPr>
           <a:xfrm>
-            <a:off x="387292" y="1152954"/>
-            <a:ext cx="3476351" cy="4669465"/>
+            <a:off x="356119" y="1578985"/>
+            <a:ext cx="3476351" cy="4762071"/>
           </a:xfrm>
           <a:prstGeom prst="rect">
             <a:avLst/>
@@ -4773,7 +4773,7 @@
         </p:nvSpPr>
         <p:spPr>
           <a:xfrm>
-            <a:off x="387292" y="751695"/>
+            <a:off x="307493" y="1104992"/>
             <a:ext cx="3211175" cy="307777"/>
           </a:xfrm>
           <a:prstGeom prst="rect">
@@ -4809,7 +4809,7 @@
         </p:nvSpPr>
         <p:spPr>
           <a:xfrm>
-            <a:off x="3284274" y="3793348"/>
+            <a:off x="3253101" y="4219379"/>
             <a:ext cx="1613725" cy="429658"/>
           </a:xfrm>
           <a:prstGeom prst="rect">
@@ -4861,7 +4861,7 @@
         </p:nvSpPr>
         <p:spPr>
           <a:xfrm>
-            <a:off x="387292" y="1168225"/>
+            <a:off x="356119" y="1594256"/>
             <a:ext cx="3434101" cy="307777"/>
           </a:xfrm>
           <a:prstGeom prst="rect">
@@ -4913,7 +4913,7 @@
         </p:nvCxnSpPr>
         <p:spPr>
           <a:xfrm>
-            <a:off x="764286" y="3512785"/>
+            <a:off x="733113" y="3938816"/>
             <a:ext cx="0" cy="2059500"/>
           </a:xfrm>
           <a:prstGeom prst="line">
@@ -4949,7 +4949,7 @@
         </p:nvSpPr>
         <p:spPr>
           <a:xfrm>
-            <a:off x="1081275" y="3921255"/>
+            <a:off x="1050102" y="4347286"/>
             <a:ext cx="1501835" cy="301751"/>
           </a:xfrm>
           <a:prstGeom prst="rect">
@@ -5009,7 +5009,7 @@
         </p:nvSpPr>
         <p:spPr>
           <a:xfrm>
-            <a:off x="1086758" y="4407506"/>
+            <a:off x="1055585" y="4833537"/>
             <a:ext cx="1496352" cy="301751"/>
           </a:xfrm>
           <a:prstGeom prst="rect">
@@ -5069,7 +5069,7 @@
         </p:nvSpPr>
         <p:spPr>
           <a:xfrm>
-            <a:off x="1080125" y="4846390"/>
+            <a:off x="1048952" y="5272421"/>
             <a:ext cx="1496352" cy="301751"/>
           </a:xfrm>
           <a:prstGeom prst="rect">
@@ -5129,7 +5129,7 @@
         </p:nvSpPr>
         <p:spPr>
           <a:xfrm>
-            <a:off x="1036550" y="5417727"/>
+            <a:off x="1005377" y="5843758"/>
             <a:ext cx="2076196" cy="301751"/>
           </a:xfrm>
           <a:prstGeom prst="rect">
@@ -5191,7 +5191,7 @@
         </p:nvCxnSpPr>
         <p:spPr>
           <a:xfrm>
-            <a:off x="764286" y="4072131"/>
+            <a:off x="733113" y="4498162"/>
             <a:ext cx="316988" cy="0"/>
           </a:xfrm>
           <a:prstGeom prst="line">
@@ -5229,7 +5229,7 @@
         </p:nvCxnSpPr>
         <p:spPr>
           <a:xfrm flipV="1">
-            <a:off x="764286" y="4558381"/>
+            <a:off x="733113" y="4984412"/>
             <a:ext cx="316988" cy="1453"/>
           </a:xfrm>
           <a:prstGeom prst="line">
@@ -5268,7 +5268,7 @@
         </p:nvCxnSpPr>
         <p:spPr>
           <a:xfrm>
-            <a:off x="764286" y="4997265"/>
+            <a:off x="733113" y="5423296"/>
             <a:ext cx="315839" cy="1"/>
           </a:xfrm>
           <a:prstGeom prst="line">
@@ -5306,7 +5306,7 @@
         </p:nvCxnSpPr>
         <p:spPr>
           <a:xfrm>
-            <a:off x="755142" y="5563141"/>
+            <a:off x="723969" y="5989172"/>
             <a:ext cx="272264" cy="0"/>
           </a:xfrm>
           <a:prstGeom prst="line">
@@ -5342,7 +5342,7 @@
         </p:nvSpPr>
         <p:spPr>
           <a:xfrm>
-            <a:off x="4588231" y="1183714"/>
+            <a:off x="4557058" y="1609745"/>
             <a:ext cx="3437569" cy="307777"/>
           </a:xfrm>
           <a:prstGeom prst="rect">
@@ -5390,7 +5390,7 @@
         </p:nvSpPr>
         <p:spPr>
           <a:xfrm>
-            <a:off x="4542249" y="778976"/>
+            <a:off x="4465979" y="1077081"/>
             <a:ext cx="3211175" cy="307777"/>
           </a:xfrm>
           <a:prstGeom prst="rect">
@@ -5426,7 +5426,7 @@
         </p:nvSpPr>
         <p:spPr>
           <a:xfrm>
-            <a:off x="5205848" y="2022967"/>
+            <a:off x="5174675" y="2448998"/>
             <a:ext cx="800111" cy="295727"/>
           </a:xfrm>
           <a:prstGeom prst="rect">
@@ -5493,7 +5493,7 @@
         </p:nvCxnSpPr>
         <p:spPr>
           <a:xfrm rot="10800000" flipV="1">
-            <a:off x="2576478" y="4008176"/>
+            <a:off x="2545305" y="4434207"/>
             <a:ext cx="707797" cy="989089"/>
           </a:xfrm>
           <a:prstGeom prst="bentConnector3">
@@ -5536,7 +5536,7 @@
         </p:nvCxnSpPr>
         <p:spPr>
           <a:xfrm>
-            <a:off x="2583110" y="4038549"/>
+            <a:off x="2551937" y="4464580"/>
             <a:ext cx="214954" cy="0"/>
           </a:xfrm>
           <a:prstGeom prst="line">
@@ -5575,7 +5575,7 @@
         </p:nvSpPr>
         <p:spPr>
           <a:xfrm>
-            <a:off x="4575947" y="1626477"/>
+            <a:off x="4544774" y="2052508"/>
             <a:ext cx="1539240" cy="276999"/>
           </a:xfrm>
           <a:prstGeom prst="rect">
@@ -5611,7 +5611,7 @@
         </p:nvSpPr>
         <p:spPr>
           <a:xfrm>
-            <a:off x="6508388" y="2408918"/>
+            <a:off x="6477215" y="2834949"/>
             <a:ext cx="1193597" cy="292311"/>
           </a:xfrm>
           <a:prstGeom prst="rect">
@@ -5672,7 +5672,7 @@
         </p:nvCxnSpPr>
         <p:spPr>
           <a:xfrm>
-            <a:off x="6316891" y="1709950"/>
+            <a:off x="6285718" y="2135981"/>
             <a:ext cx="0" cy="3862335"/>
           </a:xfrm>
           <a:prstGeom prst="line">
@@ -5711,7 +5711,7 @@
         </p:nvCxnSpPr>
         <p:spPr>
           <a:xfrm>
-            <a:off x="10676382" y="5512100"/>
+            <a:off x="10645209" y="5938131"/>
             <a:ext cx="0" cy="0"/>
           </a:xfrm>
           <a:prstGeom prst="line">
@@ -5747,7 +5747,7 @@
         </p:nvSpPr>
         <p:spPr>
           <a:xfrm>
-            <a:off x="7134938" y="1757487"/>
+            <a:off x="7103765" y="2183518"/>
             <a:ext cx="1193597" cy="281016"/>
           </a:xfrm>
           <a:prstGeom prst="rect">
@@ -5801,7 +5801,7 @@
         </p:nvCxnSpPr>
         <p:spPr>
           <a:xfrm>
-            <a:off x="8506065" y="855964"/>
+            <a:off x="8474892" y="1281995"/>
             <a:ext cx="0" cy="5059061"/>
           </a:xfrm>
           <a:prstGeom prst="line">
@@ -5845,7 +5845,7 @@
         </p:nvSpPr>
         <p:spPr>
           <a:xfrm>
-            <a:off x="8756339" y="1234300"/>
+            <a:off x="8725166" y="1660331"/>
             <a:ext cx="3048369" cy="307777"/>
           </a:xfrm>
           <a:prstGeom prst="rect">
@@ -5893,7 +5893,7 @@
         </p:nvSpPr>
         <p:spPr>
           <a:xfrm>
-            <a:off x="8895967" y="1766681"/>
+            <a:off x="8864794" y="2192712"/>
             <a:ext cx="1145147" cy="319040"/>
           </a:xfrm>
           <a:prstGeom prst="rect">
@@ -5945,7 +5945,7 @@
         </p:nvSpPr>
         <p:spPr>
           <a:xfrm>
-            <a:off x="8657231" y="809184"/>
+            <a:off x="8624465" y="1104992"/>
             <a:ext cx="3211175" cy="307777"/>
           </a:xfrm>
           <a:prstGeom prst="rect">
@@ -5981,7 +5981,7 @@
         </p:nvSpPr>
         <p:spPr>
           <a:xfrm>
-            <a:off x="8735434" y="1471459"/>
+            <a:off x="8704261" y="1897490"/>
             <a:ext cx="1567960" cy="276999"/>
           </a:xfrm>
           <a:prstGeom prst="rect">
@@ -6017,7 +6017,7 @@
         </p:nvSpPr>
         <p:spPr>
           <a:xfrm>
-            <a:off x="10303394" y="1764976"/>
+            <a:off x="10272221" y="2191007"/>
             <a:ext cx="1501314" cy="320745"/>
           </a:xfrm>
           <a:prstGeom prst="rect">
@@ -6085,7 +6085,7 @@
         </p:blipFill>
         <p:spPr>
           <a:xfrm>
-            <a:off x="458695" y="1471459"/>
+            <a:off x="427522" y="1897490"/>
             <a:ext cx="3286336" cy="1766405"/>
           </a:xfrm>
           <a:prstGeom prst="rect">
@@ -6112,7 +6112,7 @@
         </p:nvSpPr>
         <p:spPr>
           <a:xfrm>
-            <a:off x="2536535" y="3222397"/>
+            <a:off x="2505362" y="3648428"/>
             <a:ext cx="1000146" cy="295727"/>
           </a:xfrm>
           <a:prstGeom prst="rect">
@@ -6172,7 +6172,7 @@
         </p:nvSpPr>
         <p:spPr>
           <a:xfrm>
-            <a:off x="579387" y="3217349"/>
+            <a:off x="548214" y="3643380"/>
             <a:ext cx="1000146" cy="295727"/>
           </a:xfrm>
           <a:prstGeom prst="rect">
@@ -6232,7 +6232,7 @@
         </p:nvSpPr>
         <p:spPr>
           <a:xfrm>
-            <a:off x="3304874" y="4912424"/>
+            <a:off x="3273701" y="5338455"/>
             <a:ext cx="1613725" cy="429658"/>
           </a:xfrm>
           <a:prstGeom prst="rect">
@@ -6286,7 +6286,7 @@
         </p:nvCxnSpPr>
         <p:spPr>
           <a:xfrm>
-            <a:off x="2583110" y="4568794"/>
+            <a:off x="2551937" y="4994825"/>
             <a:ext cx="259787" cy="0"/>
           </a:xfrm>
           <a:prstGeom prst="line">
@@ -6327,7 +6327,7 @@
         </p:nvCxnSpPr>
         <p:spPr>
           <a:xfrm flipH="1">
-            <a:off x="2935723" y="3518124"/>
+            <a:off x="2904550" y="3944155"/>
             <a:ext cx="0" cy="1864707"/>
           </a:xfrm>
           <a:prstGeom prst="straightConnector1">
@@ -6369,7 +6369,7 @@
         </p:nvCxnSpPr>
         <p:spPr>
           <a:xfrm flipH="1" flipV="1">
-            <a:off x="3035808" y="4008176"/>
+            <a:off x="3004635" y="4434207"/>
             <a:ext cx="9610" cy="1374655"/>
           </a:xfrm>
           <a:prstGeom prst="line">
@@ -6412,7 +6412,7 @@
         </p:nvCxnSpPr>
         <p:spPr>
           <a:xfrm rot="10800000" flipV="1">
-            <a:off x="3112746" y="5127253"/>
+            <a:off x="3081573" y="5553284"/>
             <a:ext cx="192128" cy="441350"/>
           </a:xfrm>
           <a:prstGeom prst="bentConnector3">
@@ -6455,7 +6455,7 @@
         </p:nvCxnSpPr>
         <p:spPr>
           <a:xfrm rot="5400000">
-            <a:off x="4160357" y="2738798"/>
+            <a:off x="4129184" y="3164829"/>
             <a:ext cx="1628741" cy="456830"/>
           </a:xfrm>
           <a:prstGeom prst="bentConnector3">
@@ -6502,7 +6502,7 @@
         </p:nvCxnSpPr>
         <p:spPr>
           <a:xfrm>
-            <a:off x="4739505" y="2577618"/>
+            <a:off x="4708332" y="3003649"/>
             <a:ext cx="463636" cy="0"/>
           </a:xfrm>
           <a:prstGeom prst="line">
@@ -6547,7 +6547,7 @@
         </p:nvCxnSpPr>
         <p:spPr>
           <a:xfrm>
-            <a:off x="4750455" y="2961275"/>
+            <a:off x="4719282" y="3387306"/>
             <a:ext cx="463636" cy="0"/>
           </a:xfrm>
           <a:prstGeom prst="line">
@@ -6592,7 +6592,7 @@
         </p:nvCxnSpPr>
         <p:spPr>
           <a:xfrm>
-            <a:off x="4739505" y="3370261"/>
+            <a:off x="4708332" y="3796292"/>
             <a:ext cx="463636" cy="0"/>
           </a:xfrm>
           <a:prstGeom prst="line">
@@ -6638,7 +6638,7 @@
         </p:nvCxnSpPr>
         <p:spPr>
           <a:xfrm flipH="1">
-            <a:off x="5605903" y="2318694"/>
+            <a:off x="5574730" y="2744725"/>
             <a:ext cx="1" cy="1474654"/>
           </a:xfrm>
           <a:prstGeom prst="straightConnector1">
@@ -6678,7 +6678,7 @@
         </p:nvSpPr>
         <p:spPr>
           <a:xfrm>
-            <a:off x="5214092" y="2429755"/>
+            <a:off x="5182919" y="2855786"/>
             <a:ext cx="800111" cy="295727"/>
           </a:xfrm>
           <a:prstGeom prst="rect">
@@ -6742,7 +6742,7 @@
         </p:nvSpPr>
         <p:spPr>
           <a:xfrm>
-            <a:off x="5214091" y="2835738"/>
+            <a:off x="5182918" y="3261769"/>
             <a:ext cx="800111" cy="295727"/>
           </a:xfrm>
           <a:prstGeom prst="rect">
@@ -6806,7 +6806,7 @@
         </p:nvSpPr>
         <p:spPr>
           <a:xfrm>
-            <a:off x="5203141" y="3249247"/>
+            <a:off x="5171968" y="3675278"/>
             <a:ext cx="800111" cy="295727"/>
           </a:xfrm>
           <a:prstGeom prst="rect">
@@ -6878,7 +6878,7 @@
         </p:blipFill>
         <p:spPr>
           <a:xfrm>
-            <a:off x="5229223" y="3819709"/>
+            <a:off x="5198050" y="4245740"/>
             <a:ext cx="762864" cy="663898"/>
           </a:xfrm>
           <a:prstGeom prst="rect">
@@ -6905,7 +6905,7 @@
         </p:nvSpPr>
         <p:spPr>
           <a:xfrm>
-            <a:off x="5243776" y="5240667"/>
+            <a:off x="5212603" y="5666698"/>
             <a:ext cx="800111" cy="295727"/>
           </a:xfrm>
           <a:prstGeom prst="rect">
@@ -6971,7 +6971,7 @@
         </p:nvCxnSpPr>
         <p:spPr>
           <a:xfrm flipH="1">
-            <a:off x="5607256" y="4510430"/>
+            <a:off x="5576083" y="4936461"/>
             <a:ext cx="0" cy="747916"/>
           </a:xfrm>
           <a:prstGeom prst="straightConnector1">
@@ -7011,7 +7011,7 @@
         </p:nvSpPr>
         <p:spPr>
           <a:xfrm>
-            <a:off x="5225581" y="4764560"/>
+            <a:off x="5194408" y="5190591"/>
             <a:ext cx="800111" cy="295727"/>
           </a:xfrm>
           <a:prstGeom prst="rect">
@@ -7079,7 +7079,7 @@
         </p:nvCxnSpPr>
         <p:spPr>
           <a:xfrm rot="10800000" flipV="1">
-            <a:off x="4918599" y="4912423"/>
+            <a:off x="4887426" y="5338454"/>
             <a:ext cx="306982" cy="214829"/>
           </a:xfrm>
           <a:prstGeom prst="bentConnector3">
@@ -7128,7 +7128,7 @@
         </p:nvCxnSpPr>
         <p:spPr>
           <a:xfrm rot="10800000">
-            <a:off x="4918600" y="5127253"/>
+            <a:off x="4887427" y="5553284"/>
             <a:ext cx="325177" cy="261278"/>
           </a:xfrm>
           <a:prstGeom prst="bentConnector3">
@@ -7173,7 +7173,7 @@
         </p:nvSpPr>
         <p:spPr>
           <a:xfrm>
-            <a:off x="4564286" y="5554181"/>
+            <a:off x="4533113" y="5980212"/>
             <a:ext cx="1738957" cy="276999"/>
           </a:xfrm>
           <a:prstGeom prst="rect">
@@ -7209,7 +7209,7 @@
         </p:nvSpPr>
         <p:spPr>
           <a:xfrm>
-            <a:off x="4575947" y="4471571"/>
+            <a:off x="4544774" y="4897602"/>
             <a:ext cx="1221390" cy="276999"/>
           </a:xfrm>
           <a:prstGeom prst="rect">
@@ -7245,7 +7245,7 @@
         </p:nvSpPr>
         <p:spPr>
           <a:xfrm>
-            <a:off x="6707391" y="2863035"/>
+            <a:off x="6676218" y="3289066"/>
             <a:ext cx="828772" cy="292311"/>
           </a:xfrm>
           <a:prstGeom prst="rect">
@@ -7306,7 +7306,7 @@
         </p:nvCxnSpPr>
         <p:spPr>
           <a:xfrm rot="10800000">
-            <a:off x="6601377" y="2710402"/>
+            <a:off x="6570204" y="3136433"/>
             <a:ext cx="87164" cy="298789"/>
           </a:xfrm>
           <a:prstGeom prst="bentConnector2">
@@ -7349,7 +7349,7 @@
         </p:nvSpPr>
         <p:spPr>
           <a:xfrm>
-            <a:off x="6969200" y="3346863"/>
+            <a:off x="6938027" y="3772894"/>
             <a:ext cx="727502" cy="292311"/>
           </a:xfrm>
           <a:prstGeom prst="rect">
@@ -7408,7 +7408,7 @@
         </p:nvSpPr>
         <p:spPr>
           <a:xfrm>
-            <a:off x="6991731" y="3820085"/>
+            <a:off x="6960558" y="4246116"/>
             <a:ext cx="716596" cy="292311"/>
           </a:xfrm>
           <a:prstGeom prst="rect">
@@ -7467,7 +7467,7 @@
         </p:nvSpPr>
         <p:spPr>
           <a:xfrm>
-            <a:off x="6714523" y="3131465"/>
+            <a:off x="6683350" y="3557496"/>
             <a:ext cx="1477841" cy="246221"/>
           </a:xfrm>
           <a:prstGeom prst="rect">
@@ -7503,7 +7503,7 @@
         </p:nvSpPr>
         <p:spPr>
           <a:xfrm>
-            <a:off x="6715292" y="3622919"/>
+            <a:off x="6684119" y="4048950"/>
             <a:ext cx="1361959" cy="246221"/>
           </a:xfrm>
           <a:prstGeom prst="rect">
@@ -7541,7 +7541,7 @@
         </p:nvCxnSpPr>
         <p:spPr>
           <a:xfrm>
-            <a:off x="6755159" y="3183421"/>
+            <a:off x="6723986" y="3609452"/>
             <a:ext cx="0" cy="2453104"/>
           </a:xfrm>
           <a:prstGeom prst="line">
@@ -7586,7 +7586,7 @@
         </p:nvCxnSpPr>
         <p:spPr>
           <a:xfrm>
-            <a:off x="6768472" y="3478913"/>
+            <a:off x="6737299" y="3904944"/>
             <a:ext cx="178238" cy="0"/>
           </a:xfrm>
           <a:prstGeom prst="line">
@@ -7631,7 +7631,7 @@
         </p:nvCxnSpPr>
         <p:spPr>
           <a:xfrm>
-            <a:off x="6763923" y="3981889"/>
+            <a:off x="6732750" y="4407920"/>
             <a:ext cx="216907" cy="0"/>
           </a:xfrm>
           <a:prstGeom prst="line">
@@ -7674,7 +7674,7 @@
         </p:nvSpPr>
         <p:spPr>
           <a:xfrm>
-            <a:off x="6991731" y="4287349"/>
+            <a:off x="6960558" y="4713380"/>
             <a:ext cx="716596" cy="292311"/>
           </a:xfrm>
           <a:prstGeom prst="rect">
@@ -7733,7 +7733,7 @@
         </p:nvSpPr>
         <p:spPr>
           <a:xfrm>
-            <a:off x="6991731" y="4683347"/>
+            <a:off x="6960558" y="5109378"/>
             <a:ext cx="716596" cy="292311"/>
           </a:xfrm>
           <a:prstGeom prst="rect">
@@ -7792,7 +7792,7 @@
         </p:nvSpPr>
         <p:spPr>
           <a:xfrm>
-            <a:off x="7006060" y="5063419"/>
+            <a:off x="6974887" y="5489450"/>
             <a:ext cx="690868" cy="292311"/>
           </a:xfrm>
           <a:prstGeom prst="rect">
@@ -7851,7 +7851,7 @@
         </p:nvSpPr>
         <p:spPr>
           <a:xfrm>
-            <a:off x="7024300" y="5466274"/>
+            <a:off x="6993127" y="5892305"/>
             <a:ext cx="677684" cy="292311"/>
           </a:xfrm>
           <a:prstGeom prst="rect">
@@ -7912,7 +7912,7 @@
         </p:nvCxnSpPr>
         <p:spPr>
           <a:xfrm flipV="1">
-            <a:off x="6762466" y="4449192"/>
+            <a:off x="6731293" y="4875223"/>
             <a:ext cx="227462" cy="1285"/>
           </a:xfrm>
           <a:prstGeom prst="line">
@@ -7957,7 +7957,7 @@
         </p:nvCxnSpPr>
         <p:spPr>
           <a:xfrm>
-            <a:off x="6759374" y="4849286"/>
+            <a:off x="6728201" y="5275317"/>
             <a:ext cx="216907" cy="0"/>
           </a:xfrm>
           <a:prstGeom prst="line">
@@ -8003,7 +8003,7 @@
         </p:nvCxnSpPr>
         <p:spPr>
           <a:xfrm>
-            <a:off x="6761648" y="5209575"/>
+            <a:off x="6730475" y="5635606"/>
             <a:ext cx="244412" cy="0"/>
           </a:xfrm>
           <a:prstGeom prst="line">
@@ -8048,7 +8048,7 @@
         </p:nvCxnSpPr>
         <p:spPr>
           <a:xfrm>
-            <a:off x="6760377" y="5619254"/>
+            <a:off x="6729204" y="6045285"/>
             <a:ext cx="257099" cy="0"/>
           </a:xfrm>
           <a:prstGeom prst="line">
@@ -8094,7 +8094,7 @@
         </p:nvCxnSpPr>
         <p:spPr>
           <a:xfrm flipV="1">
-            <a:off x="6005959" y="2162019"/>
+            <a:off x="5974786" y="2588050"/>
             <a:ext cx="287246" cy="0"/>
           </a:xfrm>
           <a:prstGeom prst="line">
@@ -8135,7 +8135,7 @@
         </p:nvCxnSpPr>
         <p:spPr>
           <a:xfrm flipV="1">
-            <a:off x="6029645" y="2578741"/>
+            <a:off x="5998472" y="3004772"/>
             <a:ext cx="287246" cy="0"/>
           </a:xfrm>
           <a:prstGeom prst="line">
@@ -8176,7 +8176,7 @@
         </p:nvCxnSpPr>
         <p:spPr>
           <a:xfrm flipV="1">
-            <a:off x="6029645" y="2971077"/>
+            <a:off x="5998472" y="3397108"/>
             <a:ext cx="287246" cy="0"/>
           </a:xfrm>
           <a:prstGeom prst="line">
@@ -8217,7 +8217,7 @@
         </p:nvCxnSpPr>
         <p:spPr>
           <a:xfrm flipV="1">
-            <a:off x="6025692" y="3365212"/>
+            <a:off x="5994519" y="3791243"/>
             <a:ext cx="287246" cy="0"/>
           </a:xfrm>
           <a:prstGeom prst="line">
@@ -8258,7 +8258,7 @@
         </p:nvCxnSpPr>
         <p:spPr>
           <a:xfrm flipV="1">
-            <a:off x="6029645" y="4913546"/>
+            <a:off x="5998472" y="5339577"/>
             <a:ext cx="287246" cy="0"/>
           </a:xfrm>
           <a:prstGeom prst="line">
@@ -8299,7 +8299,7 @@
         </p:nvCxnSpPr>
         <p:spPr>
           <a:xfrm flipV="1">
-            <a:off x="6043887" y="5376202"/>
+            <a:off x="6012714" y="5802233"/>
             <a:ext cx="287246" cy="0"/>
           </a:xfrm>
           <a:prstGeom prst="line">
@@ -8338,7 +8338,7 @@
         </p:nvSpPr>
         <p:spPr>
           <a:xfrm>
-            <a:off x="6397770" y="2121072"/>
+            <a:off x="6366597" y="2547103"/>
             <a:ext cx="1496681" cy="276999"/>
           </a:xfrm>
           <a:prstGeom prst="rect">
@@ -8376,7 +8376,7 @@
         </p:nvCxnSpPr>
         <p:spPr>
           <a:xfrm>
-            <a:off x="6316891" y="4340795"/>
+            <a:off x="6285718" y="4766826"/>
             <a:ext cx="663939" cy="0"/>
           </a:xfrm>
           <a:prstGeom prst="line">
@@ -8417,7 +8417,7 @@
         </p:nvCxnSpPr>
         <p:spPr>
           <a:xfrm>
-            <a:off x="6316891" y="4748570"/>
+            <a:off x="6285718" y="5174601"/>
             <a:ext cx="663939" cy="0"/>
           </a:xfrm>
           <a:prstGeom prst="line">
@@ -8458,7 +8458,7 @@
         </p:nvCxnSpPr>
         <p:spPr>
           <a:xfrm>
-            <a:off x="6316891" y="5127253"/>
+            <a:off x="6285718" y="5553284"/>
             <a:ext cx="663939" cy="0"/>
           </a:xfrm>
           <a:prstGeom prst="line">
@@ -8499,7 +8499,7 @@
         </p:nvCxnSpPr>
         <p:spPr>
           <a:xfrm>
-            <a:off x="6316891" y="5536394"/>
+            <a:off x="6285718" y="5962425"/>
             <a:ext cx="695986" cy="0"/>
           </a:xfrm>
           <a:prstGeom prst="line">
@@ -8540,7 +8540,7 @@
         </p:nvCxnSpPr>
         <p:spPr>
           <a:xfrm>
-            <a:off x="8025800" y="2077008"/>
+            <a:off x="7994627" y="2503039"/>
             <a:ext cx="0" cy="3495277"/>
           </a:xfrm>
           <a:prstGeom prst="line">
@@ -8584,7 +8584,7 @@
         </p:nvCxnSpPr>
         <p:spPr>
           <a:xfrm>
-            <a:off x="7716278" y="3455269"/>
+            <a:off x="7685105" y="3881300"/>
             <a:ext cx="294241" cy="0"/>
           </a:xfrm>
           <a:prstGeom prst="line">
@@ -8628,7 +8628,7 @@
         </p:nvCxnSpPr>
         <p:spPr>
           <a:xfrm>
-            <a:off x="7708327" y="3909857"/>
+            <a:off x="7677154" y="4335888"/>
             <a:ext cx="294241" cy="0"/>
           </a:xfrm>
           <a:prstGeom prst="line">
@@ -8672,7 +8672,7 @@
         </p:nvCxnSpPr>
         <p:spPr>
           <a:xfrm>
-            <a:off x="7708327" y="4443351"/>
+            <a:off x="7677154" y="4869382"/>
             <a:ext cx="294241" cy="0"/>
           </a:xfrm>
           <a:prstGeom prst="line">
@@ -8716,7 +8716,7 @@
         </p:nvCxnSpPr>
         <p:spPr>
           <a:xfrm>
-            <a:off x="7708327" y="4820313"/>
+            <a:off x="7677154" y="5246344"/>
             <a:ext cx="294241" cy="0"/>
           </a:xfrm>
           <a:prstGeom prst="line">
@@ -8760,7 +8760,7 @@
         </p:nvCxnSpPr>
         <p:spPr>
           <a:xfrm>
-            <a:off x="7708327" y="5214590"/>
+            <a:off x="7677154" y="5640621"/>
             <a:ext cx="294241" cy="0"/>
           </a:xfrm>
           <a:prstGeom prst="line">
@@ -8804,7 +8804,7 @@
         </p:nvCxnSpPr>
         <p:spPr>
           <a:xfrm>
-            <a:off x="7731559" y="5572285"/>
+            <a:off x="7700386" y="5998316"/>
             <a:ext cx="294241" cy="0"/>
           </a:xfrm>
           <a:prstGeom prst="line">
@@ -8849,7 +8849,7 @@
         </p:nvCxnSpPr>
         <p:spPr>
           <a:xfrm>
-            <a:off x="8328535" y="1897995"/>
+            <a:off x="8297362" y="2324026"/>
             <a:ext cx="586865" cy="0"/>
           </a:xfrm>
           <a:prstGeom prst="straightConnector1">
@@ -8903,7 +8903,7 @@
         </p:blipFill>
         <p:spPr>
           <a:xfrm>
-            <a:off x="8887486" y="2525616"/>
+            <a:off x="8856313" y="2951647"/>
             <a:ext cx="2877236" cy="1546514"/>
           </a:xfrm>
           <a:prstGeom prst="rect">
@@ -8930,7 +8930,7 @@
         </p:nvSpPr>
         <p:spPr>
           <a:xfrm>
-            <a:off x="8720517" y="2162019"/>
+            <a:off x="8689344" y="2588050"/>
             <a:ext cx="1871614" cy="307777"/>
           </a:xfrm>
           <a:prstGeom prst="rect">
@@ -8966,7 +8966,7 @@
         </p:nvSpPr>
         <p:spPr>
           <a:xfrm>
-            <a:off x="8954548" y="4181030"/>
+            <a:off x="8923375" y="4607061"/>
             <a:ext cx="1193597" cy="281016"/>
           </a:xfrm>
           <a:prstGeom prst="rect">
@@ -9022,7 +9022,7 @@
         </p:nvCxnSpPr>
         <p:spPr>
           <a:xfrm flipV="1">
-            <a:off x="10041114" y="1925349"/>
+            <a:off x="10009941" y="2351380"/>
             <a:ext cx="262280" cy="852"/>
           </a:xfrm>
           <a:prstGeom prst="straightConnector1">
@@ -9063,7 +9063,7 @@
         </p:nvCxnSpPr>
         <p:spPr>
           <a:xfrm>
-            <a:off x="10620419" y="2085721"/>
+            <a:off x="10589246" y="2511752"/>
             <a:ext cx="0" cy="446414"/>
           </a:xfrm>
           <a:prstGeom prst="straightConnector1">
@@ -9102,8 +9102,8 @@
         </p:nvSpPr>
         <p:spPr>
           <a:xfrm>
-            <a:off x="8735434" y="4666409"/>
-            <a:ext cx="3211175" cy="1148515"/>
+            <a:off x="8704261" y="5092440"/>
+            <a:ext cx="3211175" cy="1248616"/>
           </a:xfrm>
           <a:prstGeom prst="rect">
             <a:avLst/>
@@ -9154,7 +9154,7 @@
         </p:nvSpPr>
         <p:spPr>
           <a:xfrm>
-            <a:off x="8963069" y="4812512"/>
+            <a:off x="8931896" y="5238543"/>
             <a:ext cx="1145147" cy="256018"/>
           </a:xfrm>
           <a:prstGeom prst="rect">
@@ -9210,7 +9210,7 @@
         </p:nvCxnSpPr>
         <p:spPr>
           <a:xfrm flipH="1">
-            <a:off x="9535643" y="4462046"/>
+            <a:off x="9504470" y="4888077"/>
             <a:ext cx="0" cy="350466"/>
           </a:xfrm>
           <a:prstGeom prst="straightConnector1">
@@ -9250,7 +9250,7 @@
         </p:nvSpPr>
         <p:spPr>
           <a:xfrm>
-            <a:off x="9997457" y="4393141"/>
+            <a:off x="9966284" y="4819172"/>
             <a:ext cx="2215570" cy="307777"/>
           </a:xfrm>
           <a:prstGeom prst="rect">
@@ -9289,7 +9289,7 @@
         </p:nvCxnSpPr>
         <p:spPr>
           <a:xfrm rot="16200000" flipH="1">
-            <a:off x="7177629" y="3155081"/>
+            <a:off x="7146456" y="3581112"/>
             <a:ext cx="2854800" cy="716080"/>
           </a:xfrm>
           <a:prstGeom prst="bentConnector2">
@@ -9329,7 +9329,7 @@
         </p:nvSpPr>
         <p:spPr>
           <a:xfrm>
-            <a:off x="8990700" y="5176491"/>
+            <a:off x="8959527" y="5602522"/>
             <a:ext cx="1143900" cy="516189"/>
           </a:xfrm>
           <a:prstGeom prst="rect">
@@ -9389,7 +9389,7 @@
         </p:nvSpPr>
         <p:spPr>
           <a:xfrm>
-            <a:off x="10336108" y="4968585"/>
+            <a:off x="10304935" y="5394616"/>
             <a:ext cx="570017" cy="477718"/>
           </a:xfrm>
           <a:prstGeom prst="can">
@@ -9435,7 +9435,7 @@
         </p:nvSpPr>
         <p:spPr>
           <a:xfrm>
-            <a:off x="11253934" y="4965246"/>
+            <a:off x="11222761" y="5391277"/>
             <a:ext cx="550774" cy="455686"/>
           </a:xfrm>
           <a:prstGeom prst="can">
@@ -9481,7 +9481,7 @@
         </p:nvSpPr>
         <p:spPr>
           <a:xfrm>
-            <a:off x="11020587" y="4683025"/>
+            <a:off x="10989414" y="5109056"/>
             <a:ext cx="1076162" cy="261610"/>
           </a:xfrm>
           <a:prstGeom prst="rect">
@@ -9517,7 +9517,7 @@
         </p:nvSpPr>
         <p:spPr>
           <a:xfrm>
-            <a:off x="10170807" y="4698697"/>
+            <a:off x="10139634" y="5124728"/>
             <a:ext cx="1076162" cy="261610"/>
           </a:xfrm>
           <a:prstGeom prst="rect">
@@ -9555,7 +9555,7 @@
         </p:nvCxnSpPr>
         <p:spPr>
           <a:xfrm>
-            <a:off x="10163175" y="5636525"/>
+            <a:off x="10132002" y="6062556"/>
             <a:ext cx="1428750" cy="0"/>
           </a:xfrm>
           <a:prstGeom prst="line">
@@ -9600,7 +9600,7 @@
         </p:nvCxnSpPr>
         <p:spPr>
           <a:xfrm>
-            <a:off x="10621117" y="5446303"/>
+            <a:off x="10589944" y="5872334"/>
             <a:ext cx="1" cy="190222"/>
           </a:xfrm>
           <a:prstGeom prst="line">
@@ -9644,7 +9644,7 @@
         </p:nvCxnSpPr>
         <p:spPr>
           <a:xfrm>
-            <a:off x="11572876" y="5417727"/>
+            <a:off x="11541703" y="5843758"/>
             <a:ext cx="0" cy="209433"/>
           </a:xfrm>
           <a:prstGeom prst="line">
@@ -9672,6 +9672,48 @@
           </a:fontRef>
         </p:style>
       </p:cxnSp>
+      <p:sp>
+        <p:nvSpPr>
+          <p:cNvPr id="2" name="TextBox 1">
+            <a:extLst>
+              <a:ext uri="{FF2B5EF4-FFF2-40B4-BE49-F238E27FC236}">
+                <a16:creationId xmlns:a16="http://schemas.microsoft.com/office/drawing/2014/main" id="{9A887078-4E2D-346C-254D-8656107C9DA8}"/>
+              </a:ext>
+            </a:extLst>
+          </p:cNvPr>
+          <p:cNvSpPr txBox="1"/>
+          <p:nvPr/>
+        </p:nvSpPr>
+        <p:spPr>
+          <a:xfrm>
+            <a:off x="319543" y="462947"/>
+            <a:ext cx="11666162" cy="461665"/>
+          </a:xfrm>
+          <a:prstGeom prst="rect">
+            <a:avLst/>
+          </a:prstGeom>
+          <a:noFill/>
+          <a:ln w="19050">
+            <a:solidFill>
+              <a:schemeClr val="tx1"/>
+            </a:solidFill>
+            <a:prstDash val="sysDash"/>
+          </a:ln>
+        </p:spPr>
+        <p:txBody>
+          <a:bodyPr wrap="square" rtlCol="0">
+            <a:spAutoFit/>
+          </a:bodyPr>
+          <a:lstStyle/>
+          <a:p>
+            <a:r>
+              <a:rPr lang="en-US" sz="2400" b="1" dirty="0"/>
+              <a:t>Python Virtual PLC Simulator with IEC 62541 OPC-UA-TCP Communication Protocol </a:t>
+            </a:r>
+            <a:endParaRPr lang="en-SG" sz="2400" b="1" dirty="0"/>
+          </a:p>
+        </p:txBody>
+      </p:sp>
     </p:spTree>
     <p:extLst>
       <p:ext uri="{BB962C8B-B14F-4D97-AF65-F5344CB8AC3E}">

</xml_diff>